<commit_message>
Added Refresh Token Rotation slide.
</commit_message>
<xml_diff>
--- a/OpenID Connect & OAuth.pptx
+++ b/OpenID Connect & OAuth.pptx
@@ -5,7 +5,7 @@
     <p:sldMasterId id="2147483648" r:id="rId1"/>
   </p:sldMasterIdLst>
   <p:notesMasterIdLst>
-    <p:notesMasterId r:id="rId54"/>
+    <p:notesMasterId r:id="rId57"/>
   </p:notesMasterIdLst>
   <p:sldIdLst>
     <p:sldId id="256" r:id="rId2"/>
@@ -53,13 +53,16 @@
     <p:sldId id="319" r:id="rId44"/>
     <p:sldId id="297" r:id="rId45"/>
     <p:sldId id="312" r:id="rId46"/>
-    <p:sldId id="282" r:id="rId47"/>
-    <p:sldId id="327" r:id="rId48"/>
-    <p:sldId id="308" r:id="rId49"/>
-    <p:sldId id="309" r:id="rId50"/>
-    <p:sldId id="321" r:id="rId51"/>
-    <p:sldId id="329" r:id="rId52"/>
-    <p:sldId id="262" r:id="rId53"/>
+    <p:sldId id="334" r:id="rId47"/>
+    <p:sldId id="332" r:id="rId48"/>
+    <p:sldId id="282" r:id="rId49"/>
+    <p:sldId id="327" r:id="rId50"/>
+    <p:sldId id="308" r:id="rId51"/>
+    <p:sldId id="309" r:id="rId52"/>
+    <p:sldId id="333" r:id="rId53"/>
+    <p:sldId id="321" r:id="rId54"/>
+    <p:sldId id="329" r:id="rId55"/>
+    <p:sldId id="262" r:id="rId56"/>
   </p:sldIdLst>
   <p:sldSz cx="12192000" cy="6858000"/>
   <p:notesSz cx="6858000" cy="9144000"/>
@@ -11785,7 +11788,7 @@
           <a:p>
             <a:fld id="{FF084CBC-36E0-4CC0-918D-767D7E309F2F}" type="datetimeFigureOut">
               <a:rPr lang="en-US" smtClean="0"/>
-              <a:t>11/21/2021</a:t>
+              <a:t>11/22/2021</a:t>
             </a:fld>
             <a:endParaRPr lang="en-US"/>
           </a:p>
@@ -12519,6 +12522,177 @@
           <a:bodyPr/>
           <a:lstStyle/>
           <a:p>
+            <a:r>
+              <a:rPr lang="de-AT" dirty="0"/>
+              <a:t>https://datatracker.ietf.org/doc/html/draft-ietf-oauth-security-topics-18#section-4.13</a:t>
+            </a:r>
+          </a:p>
+        </p:txBody>
+      </p:sp>
+      <p:sp>
+        <p:nvSpPr>
+          <p:cNvPr id="4" name="Slide Number Placeholder 3"/>
+          <p:cNvSpPr>
+            <a:spLocks noGrp="1"/>
+          </p:cNvSpPr>
+          <p:nvPr>
+            <p:ph type="sldNum" sz="quarter" idx="5"/>
+          </p:nvPr>
+        </p:nvSpPr>
+        <p:spPr/>
+        <p:txBody>
+          <a:bodyPr/>
+          <a:lstStyle/>
+          <a:p>
+            <a:fld id="{CFBC01FF-781E-4D25-A720-185C2D90034C}" type="slidenum">
+              <a:rPr lang="en-US" smtClean="0"/>
+              <a:t>46</a:t>
+            </a:fld>
+            <a:endParaRPr lang="en-US"/>
+          </a:p>
+        </p:txBody>
+      </p:sp>
+    </p:spTree>
+    <p:extLst>
+      <p:ext uri="{BB962C8B-B14F-4D97-AF65-F5344CB8AC3E}">
+        <p14:creationId xmlns:p14="http://schemas.microsoft.com/office/powerpoint/2010/main" val="4114863471"/>
+      </p:ext>
+    </p:extLst>
+  </p:cSld>
+  <p:clrMapOvr>
+    <a:masterClrMapping/>
+  </p:clrMapOvr>
+</p:notes>
+</file>
+
+<file path=ppt/notesSlides/notesSlide15.xml><?xml version="1.0" encoding="utf-8"?>
+<p:notes xmlns:a="http://schemas.openxmlformats.org/drawingml/2006/main" xmlns:r="http://schemas.openxmlformats.org/officeDocument/2006/relationships" xmlns:p="http://schemas.openxmlformats.org/presentationml/2006/main">
+  <p:cSld>
+    <p:spTree>
+      <p:nvGrpSpPr>
+        <p:cNvPr id="1" name=""/>
+        <p:cNvGrpSpPr/>
+        <p:nvPr/>
+      </p:nvGrpSpPr>
+      <p:grpSpPr>
+        <a:xfrm>
+          <a:off x="0" y="0"/>
+          <a:ext cx="0" cy="0"/>
+          <a:chOff x="0" y="0"/>
+          <a:chExt cx="0" cy="0"/>
+        </a:xfrm>
+      </p:grpSpPr>
+      <p:sp>
+        <p:nvSpPr>
+          <p:cNvPr id="2" name="Slide Image Placeholder 1"/>
+          <p:cNvSpPr>
+            <a:spLocks noGrp="1" noRot="1" noChangeAspect="1"/>
+          </p:cNvSpPr>
+          <p:nvPr>
+            <p:ph type="sldImg"/>
+          </p:nvPr>
+        </p:nvSpPr>
+        <p:spPr/>
+      </p:sp>
+      <p:sp>
+        <p:nvSpPr>
+          <p:cNvPr id="3" name="Notes Placeholder 2"/>
+          <p:cNvSpPr>
+            <a:spLocks noGrp="1"/>
+          </p:cNvSpPr>
+          <p:nvPr>
+            <p:ph type="body" idx="1"/>
+          </p:nvPr>
+        </p:nvSpPr>
+        <p:spPr/>
+        <p:txBody>
+          <a:bodyPr/>
+          <a:lstStyle/>
+          <a:p>
+            <a:endParaRPr lang="de-AT" dirty="0"/>
+          </a:p>
+        </p:txBody>
+      </p:sp>
+      <p:sp>
+        <p:nvSpPr>
+          <p:cNvPr id="4" name="Slide Number Placeholder 3"/>
+          <p:cNvSpPr>
+            <a:spLocks noGrp="1"/>
+          </p:cNvSpPr>
+          <p:nvPr>
+            <p:ph type="sldNum" sz="quarter" idx="5"/>
+          </p:nvPr>
+        </p:nvSpPr>
+        <p:spPr/>
+        <p:txBody>
+          <a:bodyPr/>
+          <a:lstStyle/>
+          <a:p>
+            <a:fld id="{CFBC01FF-781E-4D25-A720-185C2D90034C}" type="slidenum">
+              <a:rPr lang="en-US" smtClean="0"/>
+              <a:t>47</a:t>
+            </a:fld>
+            <a:endParaRPr lang="en-US"/>
+          </a:p>
+        </p:txBody>
+      </p:sp>
+    </p:spTree>
+    <p:extLst>
+      <p:ext uri="{BB962C8B-B14F-4D97-AF65-F5344CB8AC3E}">
+        <p14:creationId xmlns:p14="http://schemas.microsoft.com/office/powerpoint/2010/main" val="842541610"/>
+      </p:ext>
+    </p:extLst>
+  </p:cSld>
+  <p:clrMapOvr>
+    <a:masterClrMapping/>
+  </p:clrMapOvr>
+</p:notes>
+</file>
+
+<file path=ppt/notesSlides/notesSlide16.xml><?xml version="1.0" encoding="utf-8"?>
+<p:notes xmlns:a="http://schemas.openxmlformats.org/drawingml/2006/main" xmlns:r="http://schemas.openxmlformats.org/officeDocument/2006/relationships" xmlns:p="http://schemas.openxmlformats.org/presentationml/2006/main">
+  <p:cSld>
+    <p:spTree>
+      <p:nvGrpSpPr>
+        <p:cNvPr id="1" name=""/>
+        <p:cNvGrpSpPr/>
+        <p:nvPr/>
+      </p:nvGrpSpPr>
+      <p:grpSpPr>
+        <a:xfrm>
+          <a:off x="0" y="0"/>
+          <a:ext cx="0" cy="0"/>
+          <a:chOff x="0" y="0"/>
+          <a:chExt cx="0" cy="0"/>
+        </a:xfrm>
+      </p:grpSpPr>
+      <p:sp>
+        <p:nvSpPr>
+          <p:cNvPr id="2" name="Slide Image Placeholder 1"/>
+          <p:cNvSpPr>
+            <a:spLocks noGrp="1" noRot="1" noChangeAspect="1"/>
+          </p:cNvSpPr>
+          <p:nvPr>
+            <p:ph type="sldImg"/>
+          </p:nvPr>
+        </p:nvSpPr>
+        <p:spPr/>
+      </p:sp>
+      <p:sp>
+        <p:nvSpPr>
+          <p:cNvPr id="3" name="Notes Placeholder 2"/>
+          <p:cNvSpPr>
+            <a:spLocks noGrp="1"/>
+          </p:cNvSpPr>
+          <p:nvPr>
+            <p:ph type="body" idx="1"/>
+          </p:nvPr>
+        </p:nvSpPr>
+        <p:spPr/>
+        <p:txBody>
+          <a:bodyPr/>
+          <a:lstStyle/>
+          <a:p>
             <a:endParaRPr lang="en-US" dirty="0"/>
           </a:p>
         </p:txBody>
@@ -12540,7 +12714,7 @@
           <a:p>
             <a:fld id="{CFBC01FF-781E-4D25-A720-185C2D90034C}" type="slidenum">
               <a:rPr lang="en-US" smtClean="0"/>
-              <a:t>48</a:t>
+              <a:t>50</a:t>
             </a:fld>
             <a:endParaRPr lang="en-US"/>
           </a:p>
@@ -13412,7 +13586,7 @@
           <a:p>
             <a:fld id="{8272ECE3-2878-47BE-B879-BFDD2207B1DF}" type="datetimeFigureOut">
               <a:rPr lang="en-US" smtClean="0"/>
-              <a:t>11/21/2021</a:t>
+              <a:t>11/22/2021</a:t>
             </a:fld>
             <a:endParaRPr lang="en-US"/>
           </a:p>
@@ -13610,7 +13784,7 @@
           <a:p>
             <a:fld id="{8272ECE3-2878-47BE-B879-BFDD2207B1DF}" type="datetimeFigureOut">
               <a:rPr lang="en-US" smtClean="0"/>
-              <a:t>11/21/2021</a:t>
+              <a:t>11/22/2021</a:t>
             </a:fld>
             <a:endParaRPr lang="en-US"/>
           </a:p>
@@ -13818,7 +13992,7 @@
           <a:p>
             <a:fld id="{8272ECE3-2878-47BE-B879-BFDD2207B1DF}" type="datetimeFigureOut">
               <a:rPr lang="en-US" smtClean="0"/>
-              <a:t>11/21/2021</a:t>
+              <a:t>11/22/2021</a:t>
             </a:fld>
             <a:endParaRPr lang="en-US"/>
           </a:p>
@@ -14016,7 +14190,7 @@
           <a:p>
             <a:fld id="{8272ECE3-2878-47BE-B879-BFDD2207B1DF}" type="datetimeFigureOut">
               <a:rPr lang="en-US" smtClean="0"/>
-              <a:t>11/21/2021</a:t>
+              <a:t>11/22/2021</a:t>
             </a:fld>
             <a:endParaRPr lang="en-US"/>
           </a:p>
@@ -14291,7 +14465,7 @@
           <a:p>
             <a:fld id="{8272ECE3-2878-47BE-B879-BFDD2207B1DF}" type="datetimeFigureOut">
               <a:rPr lang="en-US" smtClean="0"/>
-              <a:t>11/21/2021</a:t>
+              <a:t>11/22/2021</a:t>
             </a:fld>
             <a:endParaRPr lang="en-US"/>
           </a:p>
@@ -14556,7 +14730,7 @@
           <a:p>
             <a:fld id="{8272ECE3-2878-47BE-B879-BFDD2207B1DF}" type="datetimeFigureOut">
               <a:rPr lang="en-US" smtClean="0"/>
-              <a:t>11/21/2021</a:t>
+              <a:t>11/22/2021</a:t>
             </a:fld>
             <a:endParaRPr lang="en-US"/>
           </a:p>
@@ -14968,7 +15142,7 @@
           <a:p>
             <a:fld id="{8272ECE3-2878-47BE-B879-BFDD2207B1DF}" type="datetimeFigureOut">
               <a:rPr lang="en-US" smtClean="0"/>
-              <a:t>11/21/2021</a:t>
+              <a:t>11/22/2021</a:t>
             </a:fld>
             <a:endParaRPr lang="en-US"/>
           </a:p>
@@ -15109,7 +15283,7 @@
           <a:p>
             <a:fld id="{8272ECE3-2878-47BE-B879-BFDD2207B1DF}" type="datetimeFigureOut">
               <a:rPr lang="en-US" smtClean="0"/>
-              <a:t>11/21/2021</a:t>
+              <a:t>11/22/2021</a:t>
             </a:fld>
             <a:endParaRPr lang="en-US"/>
           </a:p>
@@ -15222,7 +15396,7 @@
           <a:p>
             <a:fld id="{8272ECE3-2878-47BE-B879-BFDD2207B1DF}" type="datetimeFigureOut">
               <a:rPr lang="en-US" smtClean="0"/>
-              <a:t>11/21/2021</a:t>
+              <a:t>11/22/2021</a:t>
             </a:fld>
             <a:endParaRPr lang="en-US"/>
           </a:p>
@@ -15533,7 +15707,7 @@
           <a:p>
             <a:fld id="{8272ECE3-2878-47BE-B879-BFDD2207B1DF}" type="datetimeFigureOut">
               <a:rPr lang="en-US" smtClean="0"/>
-              <a:t>11/21/2021</a:t>
+              <a:t>11/22/2021</a:t>
             </a:fld>
             <a:endParaRPr lang="en-US"/>
           </a:p>
@@ -15821,7 +15995,7 @@
           <a:p>
             <a:fld id="{8272ECE3-2878-47BE-B879-BFDD2207B1DF}" type="datetimeFigureOut">
               <a:rPr lang="en-US" smtClean="0"/>
-              <a:t>11/21/2021</a:t>
+              <a:t>11/22/2021</a:t>
             </a:fld>
             <a:endParaRPr lang="en-US"/>
           </a:p>
@@ -16062,7 +16236,7 @@
           <a:p>
             <a:fld id="{8272ECE3-2878-47BE-B879-BFDD2207B1DF}" type="datetimeFigureOut">
               <a:rPr lang="en-US" smtClean="0"/>
-              <a:t>11/21/2021</a:t>
+              <a:t>11/22/2021</a:t>
             </a:fld>
             <a:endParaRPr lang="en-US"/>
           </a:p>
@@ -38676,6 +38850,1044 @@
       </p:grpSpPr>
       <p:sp>
         <p:nvSpPr>
+          <p:cNvPr id="4" name="Title 3">
+            <a:extLst>
+              <a:ext uri="{FF2B5EF4-FFF2-40B4-BE49-F238E27FC236}">
+                <a16:creationId xmlns:a16="http://schemas.microsoft.com/office/drawing/2014/main" id="{2B4AA342-048F-4EC1-9AEC-58DB48876605}"/>
+              </a:ext>
+            </a:extLst>
+          </p:cNvPr>
+          <p:cNvSpPr>
+            <a:spLocks noGrp="1"/>
+          </p:cNvSpPr>
+          <p:nvPr>
+            <p:ph type="title"/>
+          </p:nvPr>
+        </p:nvSpPr>
+        <p:spPr/>
+        <p:txBody>
+          <a:bodyPr/>
+          <a:lstStyle/>
+          <a:p>
+            <a:r>
+              <a:rPr lang="de-AT" dirty="0"/>
+              <a:t>Refresh Token Rotation</a:t>
+            </a:r>
+            <a:endParaRPr lang="en-US" dirty="0"/>
+          </a:p>
+        </p:txBody>
+      </p:sp>
+      <p:sp>
+        <p:nvSpPr>
+          <p:cNvPr id="3" name="Content Placeholder 2">
+            <a:extLst>
+              <a:ext uri="{FF2B5EF4-FFF2-40B4-BE49-F238E27FC236}">
+                <a16:creationId xmlns:a16="http://schemas.microsoft.com/office/drawing/2014/main" id="{4FE66D17-637A-4F3D-A319-D169687A7D29}"/>
+              </a:ext>
+            </a:extLst>
+          </p:cNvPr>
+          <p:cNvSpPr>
+            <a:spLocks noGrp="1"/>
+          </p:cNvSpPr>
+          <p:nvPr>
+            <p:ph idx="1"/>
+          </p:nvPr>
+        </p:nvSpPr>
+        <p:spPr/>
+        <p:txBody>
+          <a:bodyPr/>
+          <a:lstStyle/>
+          <a:p>
+            <a:pPr marL="0" indent="0">
+              <a:buNone/>
+            </a:pPr>
+            <a:r>
+              <a:rPr lang="de-AT" dirty="0"/>
+              <a:t>Best </a:t>
+            </a:r>
+            <a:r>
+              <a:rPr lang="de-AT" dirty="0" err="1"/>
+              <a:t>Current</a:t>
+            </a:r>
+            <a:r>
+              <a:rPr lang="de-AT" dirty="0"/>
+              <a:t> </a:t>
+            </a:r>
+            <a:r>
+              <a:rPr lang="de-AT" dirty="0" err="1"/>
+              <a:t>Pratice</a:t>
+            </a:r>
+            <a:r>
+              <a:rPr lang="de-AT" dirty="0"/>
+              <a:t> (</a:t>
+            </a:r>
+            <a:r>
+              <a:rPr lang="de-AT" dirty="0" err="1"/>
+              <a:t>Draft</a:t>
+            </a:r>
+            <a:r>
+              <a:rPr lang="de-AT" dirty="0"/>
+              <a:t>)</a:t>
+            </a:r>
+          </a:p>
+          <a:p>
+            <a:r>
+              <a:rPr lang="de-AT" dirty="0"/>
+              <a:t>Ermöglicht Erkennung missbräuchlich verwendeter Refresh Tokens</a:t>
+            </a:r>
+          </a:p>
+        </p:txBody>
+      </p:sp>
+      <p:grpSp>
+        <p:nvGrpSpPr>
+          <p:cNvPr id="5" name="Group 4">
+            <a:extLst>
+              <a:ext uri="{FF2B5EF4-FFF2-40B4-BE49-F238E27FC236}">
+                <a16:creationId xmlns:a16="http://schemas.microsoft.com/office/drawing/2014/main" id="{F47D7DD6-A472-4862-8167-336006141033}"/>
+              </a:ext>
+            </a:extLst>
+          </p:cNvPr>
+          <p:cNvGrpSpPr/>
+          <p:nvPr/>
+        </p:nvGrpSpPr>
+        <p:grpSpPr>
+          <a:xfrm>
+            <a:off x="1197661" y="4213202"/>
+            <a:ext cx="1446924" cy="1440743"/>
+            <a:chOff x="974256" y="4958709"/>
+            <a:chExt cx="1446924" cy="1440743"/>
+          </a:xfrm>
+        </p:grpSpPr>
+        <p:pic>
+          <p:nvPicPr>
+            <p:cNvPr id="6" name="Graphic 5">
+              <a:extLst>
+                <a:ext uri="{FF2B5EF4-FFF2-40B4-BE49-F238E27FC236}">
+                  <a16:creationId xmlns:a16="http://schemas.microsoft.com/office/drawing/2014/main" id="{E76BB2E9-4EB9-4786-8296-9CAE351F9093}"/>
+                </a:ext>
+              </a:extLst>
+            </p:cNvPr>
+            <p:cNvPicPr>
+              <a:picLocks noChangeAspect="1"/>
+            </p:cNvPicPr>
+            <p:nvPr/>
+          </p:nvPicPr>
+          <p:blipFill>
+            <a:blip r:embed="rId3" cstate="hqprint">
+              <a:extLst>
+                <a:ext uri="{28A0092B-C50C-407E-A947-70E740481C1C}">
+                  <a14:useLocalDpi xmlns:a14="http://schemas.microsoft.com/office/drawing/2010/main" val="0"/>
+                </a:ext>
+                <a:ext uri="{96DAC541-7B7A-43D3-8B79-37D633B846F1}">
+                  <asvg:svgBlip xmlns:asvg="http://schemas.microsoft.com/office/drawing/2016/SVG/main" r:embed="rId4"/>
+                </a:ext>
+              </a:extLst>
+            </a:blip>
+            <a:stretch>
+              <a:fillRect/>
+            </a:stretch>
+          </p:blipFill>
+          <p:spPr>
+            <a:xfrm flipH="1">
+              <a:off x="1211718" y="4958709"/>
+              <a:ext cx="972000" cy="972000"/>
+            </a:xfrm>
+            <a:prstGeom prst="rect">
+              <a:avLst/>
+            </a:prstGeom>
+          </p:spPr>
+        </p:pic>
+        <p:sp>
+          <p:nvSpPr>
+            <p:cNvPr id="7" name="TextBox 6">
+              <a:extLst>
+                <a:ext uri="{FF2B5EF4-FFF2-40B4-BE49-F238E27FC236}">
+                  <a16:creationId xmlns:a16="http://schemas.microsoft.com/office/drawing/2014/main" id="{74CC070D-0708-4670-914B-527CDBDFBCCD}"/>
+                </a:ext>
+              </a:extLst>
+            </p:cNvPr>
+            <p:cNvSpPr txBox="1"/>
+            <p:nvPr/>
+          </p:nvSpPr>
+          <p:spPr>
+            <a:xfrm>
+              <a:off x="974256" y="5937787"/>
+              <a:ext cx="1446924" cy="461665"/>
+            </a:xfrm>
+            <a:prstGeom prst="rect">
+              <a:avLst/>
+            </a:prstGeom>
+            <a:noFill/>
+          </p:spPr>
+          <p:txBody>
+            <a:bodyPr wrap="square" rtlCol="0">
+              <a:spAutoFit/>
+            </a:bodyPr>
+            <a:lstStyle/>
+            <a:p>
+              <a:pPr algn="ctr"/>
+              <a:r>
+                <a:rPr lang="de-AT" sz="1200" dirty="0"/>
+                <a:t>Public Client</a:t>
+              </a:r>
+            </a:p>
+            <a:p>
+              <a:pPr algn="ctr"/>
+              <a:r>
+                <a:rPr lang="de-AT" sz="1200" dirty="0"/>
+                <a:t>(z.B. SPA)</a:t>
+              </a:r>
+              <a:endParaRPr lang="en-US" sz="1200" dirty="0"/>
+            </a:p>
+          </p:txBody>
+        </p:sp>
+      </p:grpSp>
+      <p:grpSp>
+        <p:nvGrpSpPr>
+          <p:cNvPr id="8" name="Group 7">
+            <a:extLst>
+              <a:ext uri="{FF2B5EF4-FFF2-40B4-BE49-F238E27FC236}">
+                <a16:creationId xmlns:a16="http://schemas.microsoft.com/office/drawing/2014/main" id="{19684483-30D2-496D-ABD8-6E2C3B021E6E}"/>
+              </a:ext>
+            </a:extLst>
+          </p:cNvPr>
+          <p:cNvGrpSpPr/>
+          <p:nvPr/>
+        </p:nvGrpSpPr>
+        <p:grpSpPr>
+          <a:xfrm>
+            <a:off x="9029852" y="3730377"/>
+            <a:ext cx="1722477" cy="1866160"/>
+            <a:chOff x="4233854" y="1261553"/>
+            <a:chExt cx="1722477" cy="1866160"/>
+          </a:xfrm>
+        </p:grpSpPr>
+        <p:grpSp>
+          <p:nvGrpSpPr>
+            <p:cNvPr id="9" name="Group 8">
+              <a:extLst>
+                <a:ext uri="{FF2B5EF4-FFF2-40B4-BE49-F238E27FC236}">
+                  <a16:creationId xmlns:a16="http://schemas.microsoft.com/office/drawing/2014/main" id="{3273CB6E-104C-4E34-B61B-56F7C558AA84}"/>
+                </a:ext>
+              </a:extLst>
+            </p:cNvPr>
+            <p:cNvGrpSpPr/>
+            <p:nvPr/>
+          </p:nvGrpSpPr>
+          <p:grpSpPr>
+            <a:xfrm>
+              <a:off x="4233854" y="1261553"/>
+              <a:ext cx="1439717" cy="1382102"/>
+              <a:chOff x="6711985" y="1075720"/>
+              <a:chExt cx="1439717" cy="1382102"/>
+            </a:xfrm>
+          </p:grpSpPr>
+          <p:pic>
+            <p:nvPicPr>
+              <p:cNvPr id="11" name="Graphic 10">
+                <a:extLst>
+                  <a:ext uri="{FF2B5EF4-FFF2-40B4-BE49-F238E27FC236}">
+                    <a16:creationId xmlns:a16="http://schemas.microsoft.com/office/drawing/2014/main" id="{B3EE7B7D-2371-4005-AAE3-21B46D83E511}"/>
+                  </a:ext>
+                </a:extLst>
+              </p:cNvPr>
+              <p:cNvPicPr>
+                <a:picLocks noChangeAspect="1"/>
+              </p:cNvPicPr>
+              <p:nvPr/>
+            </p:nvPicPr>
+            <p:blipFill>
+              <a:blip r:embed="rId5" cstate="hqprint">
+                <a:extLst>
+                  <a:ext uri="{28A0092B-C50C-407E-A947-70E740481C1C}">
+                    <a14:useLocalDpi xmlns:a14="http://schemas.microsoft.com/office/drawing/2010/main" val="0"/>
+                  </a:ext>
+                  <a:ext uri="{96DAC541-7B7A-43D3-8B79-37D633B846F1}">
+                    <asvg:svgBlip xmlns:asvg="http://schemas.microsoft.com/office/drawing/2016/SVG/main" r:embed="rId6"/>
+                  </a:ext>
+                </a:extLst>
+              </a:blip>
+              <a:stretch>
+                <a:fillRect/>
+              </a:stretch>
+            </p:blipFill>
+            <p:spPr>
+              <a:xfrm>
+                <a:off x="6711985" y="1075720"/>
+                <a:ext cx="720000" cy="576000"/>
+              </a:xfrm>
+              <a:prstGeom prst="rect">
+                <a:avLst/>
+              </a:prstGeom>
+            </p:spPr>
+          </p:pic>
+          <p:pic>
+            <p:nvPicPr>
+              <p:cNvPr id="12" name="Graphic 11">
+                <a:extLst>
+                  <a:ext uri="{FF2B5EF4-FFF2-40B4-BE49-F238E27FC236}">
+                    <a16:creationId xmlns:a16="http://schemas.microsoft.com/office/drawing/2014/main" id="{49BE7030-3ADE-4862-823E-8BFB05EE3C90}"/>
+                  </a:ext>
+                </a:extLst>
+              </p:cNvPr>
+              <p:cNvPicPr>
+                <a:picLocks noChangeAspect="1"/>
+              </p:cNvPicPr>
+              <p:nvPr/>
+            </p:nvPicPr>
+            <p:blipFill>
+              <a:blip r:embed="rId7" cstate="hqprint">
+                <a:extLst>
+                  <a:ext uri="{28A0092B-C50C-407E-A947-70E740481C1C}">
+                    <a14:useLocalDpi xmlns:a14="http://schemas.microsoft.com/office/drawing/2010/main" val="0"/>
+                  </a:ext>
+                  <a:ext uri="{96DAC541-7B7A-43D3-8B79-37D633B846F1}">
+                    <asvg:svgBlip xmlns:asvg="http://schemas.microsoft.com/office/drawing/2016/SVG/main" r:embed="rId8"/>
+                  </a:ext>
+                </a:extLst>
+              </a:blip>
+              <a:stretch>
+                <a:fillRect/>
+              </a:stretch>
+            </p:blipFill>
+            <p:spPr>
+              <a:xfrm>
+                <a:off x="7215702" y="1521822"/>
+                <a:ext cx="936000" cy="936000"/>
+              </a:xfrm>
+              <a:prstGeom prst="rect">
+                <a:avLst/>
+              </a:prstGeom>
+            </p:spPr>
+          </p:pic>
+        </p:grpSp>
+        <p:sp>
+          <p:nvSpPr>
+            <p:cNvPr id="10" name="TextBox 9">
+              <a:extLst>
+                <a:ext uri="{FF2B5EF4-FFF2-40B4-BE49-F238E27FC236}">
+                  <a16:creationId xmlns:a16="http://schemas.microsoft.com/office/drawing/2014/main" id="{77313211-4B6A-4F2E-9D8E-7236FDCB0C7D}"/>
+                </a:ext>
+              </a:extLst>
+            </p:cNvPr>
+            <p:cNvSpPr txBox="1"/>
+            <p:nvPr/>
+          </p:nvSpPr>
+          <p:spPr>
+            <a:xfrm>
+              <a:off x="4509407" y="2666048"/>
+              <a:ext cx="1446924" cy="461665"/>
+            </a:xfrm>
+            <a:prstGeom prst="rect">
+              <a:avLst/>
+            </a:prstGeom>
+            <a:noFill/>
+          </p:spPr>
+          <p:txBody>
+            <a:bodyPr wrap="square" rtlCol="0">
+              <a:spAutoFit/>
+            </a:bodyPr>
+            <a:lstStyle/>
+            <a:p>
+              <a:pPr algn="ctr"/>
+              <a:r>
+                <a:rPr lang="de-AT" sz="1200" dirty="0" err="1"/>
+                <a:t>Authorization</a:t>
+              </a:r>
+              <a:r>
+                <a:rPr lang="de-AT" sz="1200" dirty="0"/>
+                <a:t> Server</a:t>
+              </a:r>
+              <a:endParaRPr lang="en-US" sz="1200" dirty="0"/>
+            </a:p>
+          </p:txBody>
+        </p:sp>
+      </p:grpSp>
+      <p:grpSp>
+        <p:nvGrpSpPr>
+          <p:cNvPr id="16" name="Group 15">
+            <a:extLst>
+              <a:ext uri="{FF2B5EF4-FFF2-40B4-BE49-F238E27FC236}">
+                <a16:creationId xmlns:a16="http://schemas.microsoft.com/office/drawing/2014/main" id="{32BFA7FB-C4C8-4C7A-9822-5CF76FFCDF0D}"/>
+              </a:ext>
+            </a:extLst>
+          </p:cNvPr>
+          <p:cNvGrpSpPr/>
+          <p:nvPr/>
+        </p:nvGrpSpPr>
+        <p:grpSpPr>
+          <a:xfrm rot="5400000">
+            <a:off x="5653515" y="1938913"/>
+            <a:ext cx="461665" cy="3582928"/>
+            <a:chOff x="3391111" y="2943383"/>
+            <a:chExt cx="461665" cy="2539308"/>
+          </a:xfrm>
+        </p:grpSpPr>
+        <p:sp>
+          <p:nvSpPr>
+            <p:cNvPr id="17" name="TextBox 16">
+              <a:extLst>
+                <a:ext uri="{FF2B5EF4-FFF2-40B4-BE49-F238E27FC236}">
+                  <a16:creationId xmlns:a16="http://schemas.microsoft.com/office/drawing/2014/main" id="{D1CEEF7D-A403-4D26-8144-FB0EB3A7A397}"/>
+                </a:ext>
+              </a:extLst>
+            </p:cNvPr>
+            <p:cNvSpPr txBox="1"/>
+            <p:nvPr/>
+          </p:nvSpPr>
+          <p:spPr>
+            <a:xfrm rot="16200000">
+              <a:off x="2352290" y="3982204"/>
+              <a:ext cx="2539308" cy="461665"/>
+            </a:xfrm>
+            <a:prstGeom prst="rect">
+              <a:avLst/>
+            </a:prstGeom>
+            <a:noFill/>
+          </p:spPr>
+          <p:txBody>
+            <a:bodyPr wrap="square" rtlCol="0">
+              <a:spAutoFit/>
+            </a:bodyPr>
+            <a:lstStyle>
+              <a:defPPr>
+                <a:defRPr lang="en-US"/>
+              </a:defPPr>
+              <a:lvl1pPr>
+                <a:defRPr sz="1200">
+                  <a:solidFill>
+                    <a:schemeClr val="bg1">
+                      <a:lumMod val="50000"/>
+                    </a:schemeClr>
+                  </a:solidFill>
+                </a:defRPr>
+              </a:lvl1pPr>
+            </a:lstStyle>
+            <a:p>
+              <a:pPr algn="ctr"/>
+              <a:r>
+                <a:rPr lang="de-AT" dirty="0"/>
+                <a:t>1. </a:t>
+              </a:r>
+              <a:r>
+                <a:rPr lang="de-AT" i="1" dirty="0"/>
+                <a:t>Client</a:t>
+              </a:r>
+              <a:r>
+                <a:rPr lang="de-AT" dirty="0"/>
+                <a:t> </a:t>
+              </a:r>
+              <a:r>
+                <a:rPr lang="de-AT" dirty="0" err="1"/>
+                <a:t>authorisiert</a:t>
+              </a:r>
+              <a:r>
+                <a:rPr lang="de-AT" dirty="0"/>
+                <a:t> sich mit </a:t>
+              </a:r>
+              <a:r>
+                <a:rPr lang="de-AT" i="1" dirty="0" err="1"/>
+                <a:t>Authorization</a:t>
+              </a:r>
+              <a:r>
+                <a:rPr lang="de-AT" i="1" dirty="0"/>
+                <a:t> Code und Code </a:t>
+              </a:r>
+              <a:r>
+                <a:rPr lang="de-AT" i="1" dirty="0" err="1"/>
+                <a:t>Verifier</a:t>
+              </a:r>
+              <a:endParaRPr lang="en-US" i="1" dirty="0"/>
+            </a:p>
+          </p:txBody>
+        </p:sp>
+        <p:cxnSp>
+          <p:nvCxnSpPr>
+            <p:cNvPr id="18" name="Straight Arrow Connector 17">
+              <a:extLst>
+                <a:ext uri="{FF2B5EF4-FFF2-40B4-BE49-F238E27FC236}">
+                  <a16:creationId xmlns:a16="http://schemas.microsoft.com/office/drawing/2014/main" id="{2711C8DF-C5AD-4F37-8CAE-4B44749CCFB5}"/>
+                </a:ext>
+              </a:extLst>
+            </p:cNvPr>
+            <p:cNvCxnSpPr>
+              <a:cxnSpLocks/>
+            </p:cNvCxnSpPr>
+            <p:nvPr/>
+          </p:nvCxnSpPr>
+          <p:spPr>
+            <a:xfrm rot="16200000" flipV="1">
+              <a:off x="2596138" y="4198259"/>
+              <a:ext cx="2493020" cy="19277"/>
+            </a:xfrm>
+            <a:prstGeom prst="straightConnector1">
+              <a:avLst/>
+            </a:prstGeom>
+            <a:ln>
+              <a:prstDash val="dash"/>
+              <a:tailEnd type="triangle"/>
+            </a:ln>
+          </p:spPr>
+          <p:style>
+            <a:lnRef idx="3">
+              <a:schemeClr val="accent3"/>
+            </a:lnRef>
+            <a:fillRef idx="0">
+              <a:schemeClr val="accent3"/>
+            </a:fillRef>
+            <a:effectRef idx="2">
+              <a:schemeClr val="accent3"/>
+            </a:effectRef>
+            <a:fontRef idx="minor">
+              <a:schemeClr val="tx1"/>
+            </a:fontRef>
+          </p:style>
+        </p:cxnSp>
+      </p:grpSp>
+      <p:cxnSp>
+        <p:nvCxnSpPr>
+          <p:cNvPr id="19" name="Connector: Curved 18">
+            <a:extLst>
+              <a:ext uri="{FF2B5EF4-FFF2-40B4-BE49-F238E27FC236}">
+                <a16:creationId xmlns:a16="http://schemas.microsoft.com/office/drawing/2014/main" id="{2582C3B7-56C4-493B-81A0-A37B5A868FDF}"/>
+              </a:ext>
+            </a:extLst>
+          </p:cNvPr>
+          <p:cNvCxnSpPr>
+            <a:cxnSpLocks/>
+            <a:stCxn id="12" idx="0"/>
+            <a:endCxn id="12" idx="3"/>
+          </p:cNvCxnSpPr>
+          <p:nvPr/>
+        </p:nvCxnSpPr>
+        <p:spPr>
+          <a:xfrm rot="16200000" flipH="1">
+            <a:off x="10001569" y="4176479"/>
+            <a:ext cx="468000" cy="468000"/>
+          </a:xfrm>
+          <a:prstGeom prst="curvedConnector4">
+            <a:avLst>
+              <a:gd name="adj1" fmla="val -48846"/>
+              <a:gd name="adj2" fmla="val 148846"/>
+            </a:avLst>
+          </a:prstGeom>
+          <a:ln>
+            <a:tailEnd type="triangle"/>
+          </a:ln>
+        </p:spPr>
+        <p:style>
+          <a:lnRef idx="3">
+            <a:schemeClr val="accent3"/>
+          </a:lnRef>
+          <a:fillRef idx="0">
+            <a:schemeClr val="accent3"/>
+          </a:fillRef>
+          <a:effectRef idx="2">
+            <a:schemeClr val="accent3"/>
+          </a:effectRef>
+          <a:fontRef idx="minor">
+            <a:schemeClr val="tx1"/>
+          </a:fontRef>
+        </p:style>
+      </p:cxnSp>
+      <p:cxnSp>
+        <p:nvCxnSpPr>
+          <p:cNvPr id="23" name="Straight Arrow Connector 22">
+            <a:extLst>
+              <a:ext uri="{FF2B5EF4-FFF2-40B4-BE49-F238E27FC236}">
+                <a16:creationId xmlns:a16="http://schemas.microsoft.com/office/drawing/2014/main" id="{BFE51ADF-EEB8-480E-8F35-A1336CE8BC84}"/>
+              </a:ext>
+            </a:extLst>
+          </p:cNvPr>
+          <p:cNvCxnSpPr>
+            <a:cxnSpLocks/>
+          </p:cNvCxnSpPr>
+          <p:nvPr/>
+        </p:nvCxnSpPr>
+        <p:spPr>
+          <a:xfrm rot="5400000">
+            <a:off x="5892184" y="2820547"/>
+            <a:ext cx="0" cy="3518783"/>
+          </a:xfrm>
+          <a:prstGeom prst="straightConnector1">
+            <a:avLst/>
+          </a:prstGeom>
+          <a:ln>
+            <a:prstDash val="dash"/>
+            <a:tailEnd type="triangle"/>
+          </a:ln>
+        </p:spPr>
+        <p:style>
+          <a:lnRef idx="3">
+            <a:schemeClr val="accent3"/>
+          </a:lnRef>
+          <a:fillRef idx="0">
+            <a:schemeClr val="accent3"/>
+          </a:fillRef>
+          <a:effectRef idx="2">
+            <a:schemeClr val="accent3"/>
+          </a:effectRef>
+          <a:fontRef idx="minor">
+            <a:schemeClr val="tx1"/>
+          </a:fontRef>
+        </p:style>
+      </p:cxnSp>
+      <p:sp>
+        <p:nvSpPr>
+          <p:cNvPr id="24" name="TextBox 23">
+            <a:extLst>
+              <a:ext uri="{FF2B5EF4-FFF2-40B4-BE49-F238E27FC236}">
+                <a16:creationId xmlns:a16="http://schemas.microsoft.com/office/drawing/2014/main" id="{379C94E6-CBE9-4504-AFC7-4CDB88574A9C}"/>
+              </a:ext>
+            </a:extLst>
+          </p:cNvPr>
+          <p:cNvSpPr txBox="1"/>
+          <p:nvPr/>
+        </p:nvSpPr>
+        <p:spPr>
+          <a:xfrm>
+            <a:off x="4194961" y="4143939"/>
+            <a:ext cx="3456615" cy="461665"/>
+          </a:xfrm>
+          <a:prstGeom prst="rect">
+            <a:avLst/>
+          </a:prstGeom>
+          <a:noFill/>
+        </p:spPr>
+        <p:txBody>
+          <a:bodyPr wrap="square" rtlCol="0">
+            <a:spAutoFit/>
+          </a:bodyPr>
+          <a:lstStyle>
+            <a:defPPr>
+              <a:defRPr lang="en-US"/>
+            </a:defPPr>
+            <a:lvl1pPr>
+              <a:defRPr sz="1200">
+                <a:solidFill>
+                  <a:schemeClr val="bg1">
+                    <a:lumMod val="50000"/>
+                  </a:schemeClr>
+                </a:solidFill>
+              </a:defRPr>
+            </a:lvl1pPr>
+          </a:lstStyle>
+          <a:p>
+            <a:pPr algn="ctr"/>
+            <a:r>
+              <a:rPr lang="de-AT" dirty="0"/>
+              <a:t>2. Erzeugt einen</a:t>
+            </a:r>
+            <a:r>
+              <a:rPr lang="de-AT" i="1" dirty="0"/>
+              <a:t> Access- (</a:t>
+            </a:r>
+            <a:r>
+              <a:rPr lang="de-AT" dirty="0"/>
+              <a:t>und optional </a:t>
+            </a:r>
+            <a:r>
+              <a:rPr lang="de-AT" i="1" dirty="0"/>
+              <a:t>Refresh) Token 1</a:t>
+            </a:r>
+            <a:endParaRPr lang="en-US" i="1" dirty="0"/>
+          </a:p>
+        </p:txBody>
+      </p:sp>
+      <p:cxnSp>
+        <p:nvCxnSpPr>
+          <p:cNvPr id="31" name="Straight Arrow Connector 30">
+            <a:extLst>
+              <a:ext uri="{FF2B5EF4-FFF2-40B4-BE49-F238E27FC236}">
+                <a16:creationId xmlns:a16="http://schemas.microsoft.com/office/drawing/2014/main" id="{4D61DF9F-5759-44EC-8F41-F9EE769B47FE}"/>
+              </a:ext>
+            </a:extLst>
+          </p:cNvPr>
+          <p:cNvCxnSpPr>
+            <a:cxnSpLocks/>
+          </p:cNvCxnSpPr>
+          <p:nvPr/>
+        </p:nvCxnSpPr>
+        <p:spPr>
+          <a:xfrm rot="5400000">
+            <a:off x="5861099" y="4428909"/>
+            <a:ext cx="0" cy="3518783"/>
+          </a:xfrm>
+          <a:prstGeom prst="straightConnector1">
+            <a:avLst/>
+          </a:prstGeom>
+          <a:ln>
+            <a:prstDash val="dash"/>
+            <a:tailEnd type="triangle"/>
+          </a:ln>
+        </p:spPr>
+        <p:style>
+          <a:lnRef idx="3">
+            <a:schemeClr val="accent3"/>
+          </a:lnRef>
+          <a:fillRef idx="0">
+            <a:schemeClr val="accent3"/>
+          </a:fillRef>
+          <a:effectRef idx="2">
+            <a:schemeClr val="accent3"/>
+          </a:effectRef>
+          <a:fontRef idx="minor">
+            <a:schemeClr val="tx1"/>
+          </a:fontRef>
+        </p:style>
+      </p:cxnSp>
+      <p:sp>
+        <p:nvSpPr>
+          <p:cNvPr id="32" name="TextBox 31">
+            <a:extLst>
+              <a:ext uri="{FF2B5EF4-FFF2-40B4-BE49-F238E27FC236}">
+                <a16:creationId xmlns:a16="http://schemas.microsoft.com/office/drawing/2014/main" id="{25771813-7133-4A41-8BA4-5CF6A244374B}"/>
+              </a:ext>
+            </a:extLst>
+          </p:cNvPr>
+          <p:cNvSpPr txBox="1"/>
+          <p:nvPr/>
+        </p:nvSpPr>
+        <p:spPr>
+          <a:xfrm>
+            <a:off x="4194961" y="4933574"/>
+            <a:ext cx="3456615" cy="461665"/>
+          </a:xfrm>
+          <a:prstGeom prst="rect">
+            <a:avLst/>
+          </a:prstGeom>
+          <a:noFill/>
+        </p:spPr>
+        <p:txBody>
+          <a:bodyPr wrap="square" rtlCol="0">
+            <a:spAutoFit/>
+          </a:bodyPr>
+          <a:lstStyle>
+            <a:defPPr>
+              <a:defRPr lang="en-US"/>
+            </a:defPPr>
+            <a:lvl1pPr>
+              <a:defRPr sz="1200">
+                <a:solidFill>
+                  <a:schemeClr val="bg1">
+                    <a:lumMod val="50000"/>
+                  </a:schemeClr>
+                </a:solidFill>
+              </a:defRPr>
+            </a:lvl1pPr>
+          </a:lstStyle>
+          <a:p>
+            <a:pPr algn="ctr"/>
+            <a:r>
+              <a:rPr lang="de-AT" dirty="0"/>
+              <a:t>3. Anforderung eines neuen Access Token mit Refresh Token 1</a:t>
+            </a:r>
+            <a:endParaRPr lang="en-US" i="1" dirty="0"/>
+          </a:p>
+        </p:txBody>
+      </p:sp>
+      <p:cxnSp>
+        <p:nvCxnSpPr>
+          <p:cNvPr id="36" name="Straight Arrow Connector 35">
+            <a:extLst>
+              <a:ext uri="{FF2B5EF4-FFF2-40B4-BE49-F238E27FC236}">
+                <a16:creationId xmlns:a16="http://schemas.microsoft.com/office/drawing/2014/main" id="{FCD2BC6A-3025-4F10-A191-4635D11CD468}"/>
+              </a:ext>
+            </a:extLst>
+          </p:cNvPr>
+          <p:cNvCxnSpPr>
+            <a:cxnSpLocks/>
+          </p:cNvCxnSpPr>
+          <p:nvPr/>
+        </p:nvCxnSpPr>
+        <p:spPr>
+          <a:xfrm flipV="1">
+            <a:off x="4133959" y="5400671"/>
+            <a:ext cx="3517617" cy="19277"/>
+          </a:xfrm>
+          <a:prstGeom prst="straightConnector1">
+            <a:avLst/>
+          </a:prstGeom>
+          <a:ln>
+            <a:prstDash val="dash"/>
+            <a:tailEnd type="triangle"/>
+          </a:ln>
+        </p:spPr>
+        <p:style>
+          <a:lnRef idx="3">
+            <a:schemeClr val="accent3"/>
+          </a:lnRef>
+          <a:fillRef idx="0">
+            <a:schemeClr val="accent3"/>
+          </a:fillRef>
+          <a:effectRef idx="2">
+            <a:schemeClr val="accent3"/>
+          </a:effectRef>
+          <a:fontRef idx="minor">
+            <a:schemeClr val="tx1"/>
+          </a:fontRef>
+        </p:style>
+      </p:cxnSp>
+      <p:sp>
+        <p:nvSpPr>
+          <p:cNvPr id="37" name="TextBox 36">
+            <a:extLst>
+              <a:ext uri="{FF2B5EF4-FFF2-40B4-BE49-F238E27FC236}">
+                <a16:creationId xmlns:a16="http://schemas.microsoft.com/office/drawing/2014/main" id="{5BE2BF0A-E329-4FA5-AAAB-83670C0EF89C}"/>
+              </a:ext>
+            </a:extLst>
+          </p:cNvPr>
+          <p:cNvSpPr txBox="1"/>
+          <p:nvPr/>
+        </p:nvSpPr>
+        <p:spPr>
+          <a:xfrm>
+            <a:off x="4163876" y="5726635"/>
+            <a:ext cx="3456615" cy="461665"/>
+          </a:xfrm>
+          <a:prstGeom prst="rect">
+            <a:avLst/>
+          </a:prstGeom>
+          <a:noFill/>
+        </p:spPr>
+        <p:txBody>
+          <a:bodyPr wrap="square" rtlCol="0">
+            <a:spAutoFit/>
+          </a:bodyPr>
+          <a:lstStyle>
+            <a:defPPr>
+              <a:defRPr lang="en-US"/>
+            </a:defPPr>
+            <a:lvl1pPr>
+              <a:defRPr sz="1200">
+                <a:solidFill>
+                  <a:schemeClr val="bg1">
+                    <a:lumMod val="50000"/>
+                  </a:schemeClr>
+                </a:solidFill>
+              </a:defRPr>
+            </a:lvl1pPr>
+          </a:lstStyle>
+          <a:p>
+            <a:pPr algn="ctr"/>
+            <a:r>
+              <a:rPr lang="de-AT" i="1" dirty="0"/>
+              <a:t>4. Erzeugt ein neues Access Token und ein neues Refresh Token 2</a:t>
+            </a:r>
+            <a:endParaRPr lang="en-US" i="1" dirty="0"/>
+          </a:p>
+        </p:txBody>
+      </p:sp>
+    </p:spTree>
+    <p:extLst>
+      <p:ext uri="{BB962C8B-B14F-4D97-AF65-F5344CB8AC3E}">
+        <p14:creationId xmlns:p14="http://schemas.microsoft.com/office/powerpoint/2010/main" val="686527897"/>
+      </p:ext>
+    </p:extLst>
+  </p:cSld>
+  <p:clrMapOvr>
+    <a:masterClrMapping/>
+  </p:clrMapOvr>
+</p:sld>
+</file>
+
+<file path=ppt/slides/slide47.xml><?xml version="1.0" encoding="utf-8"?>
+<p:sld xmlns:a="http://schemas.openxmlformats.org/drawingml/2006/main" xmlns:r="http://schemas.openxmlformats.org/officeDocument/2006/relationships" xmlns:p="http://schemas.openxmlformats.org/presentationml/2006/main">
+  <p:cSld>
+    <p:spTree>
+      <p:nvGrpSpPr>
+        <p:cNvPr id="1" name=""/>
+        <p:cNvGrpSpPr/>
+        <p:nvPr/>
+      </p:nvGrpSpPr>
+      <p:grpSpPr>
+        <a:xfrm>
+          <a:off x="0" y="0"/>
+          <a:ext cx="0" cy="0"/>
+          <a:chOff x="0" y="0"/>
+          <a:chExt cx="0" cy="0"/>
+        </a:xfrm>
+      </p:grpSpPr>
+      <p:sp>
+        <p:nvSpPr>
+          <p:cNvPr id="5" name="Title 4">
+            <a:extLst>
+              <a:ext uri="{FF2B5EF4-FFF2-40B4-BE49-F238E27FC236}">
+                <a16:creationId xmlns:a16="http://schemas.microsoft.com/office/drawing/2014/main" id="{9669D065-6F17-4963-900D-50C45C24AB59}"/>
+              </a:ext>
+            </a:extLst>
+          </p:cNvPr>
+          <p:cNvSpPr>
+            <a:spLocks noGrp="1"/>
+          </p:cNvSpPr>
+          <p:nvPr>
+            <p:ph type="title"/>
+          </p:nvPr>
+        </p:nvSpPr>
+        <p:spPr/>
+        <p:txBody>
+          <a:bodyPr/>
+          <a:lstStyle/>
+          <a:p>
+            <a:r>
+              <a:rPr lang="de-AT" dirty="0"/>
+              <a:t>Zusammenfassung</a:t>
+            </a:r>
+            <a:endParaRPr lang="en-US" dirty="0"/>
+          </a:p>
+        </p:txBody>
+      </p:sp>
+      <p:sp>
+        <p:nvSpPr>
+          <p:cNvPr id="6" name="Text Placeholder 5">
+            <a:extLst>
+              <a:ext uri="{FF2B5EF4-FFF2-40B4-BE49-F238E27FC236}">
+                <a16:creationId xmlns:a16="http://schemas.microsoft.com/office/drawing/2014/main" id="{C6AB916B-34BA-419E-9C93-C8EDF2A4832D}"/>
+              </a:ext>
+            </a:extLst>
+          </p:cNvPr>
+          <p:cNvSpPr>
+            <a:spLocks noGrp="1"/>
+          </p:cNvSpPr>
+          <p:nvPr>
+            <p:ph type="body" idx="1"/>
+          </p:nvPr>
+        </p:nvSpPr>
+        <p:spPr/>
+        <p:txBody>
+          <a:bodyPr/>
+          <a:lstStyle/>
+          <a:p>
+            <a:endParaRPr lang="en-US" dirty="0"/>
+          </a:p>
+        </p:txBody>
+      </p:sp>
+      <p:pic>
+        <p:nvPicPr>
+          <p:cNvPr id="4" name="Picture 4" descr="Bildergebnis fÃ¼r openid connect">
+            <a:extLst>
+              <a:ext uri="{FF2B5EF4-FFF2-40B4-BE49-F238E27FC236}">
+                <a16:creationId xmlns:a16="http://schemas.microsoft.com/office/drawing/2014/main" id="{B1CF878A-E214-4B07-B017-0AD96D518EC7}"/>
+              </a:ext>
+            </a:extLst>
+          </p:cNvPr>
+          <p:cNvPicPr>
+            <a:picLocks noChangeAspect="1" noChangeArrowheads="1"/>
+          </p:cNvPicPr>
+          <p:nvPr/>
+        </p:nvPicPr>
+        <p:blipFill>
+          <a:blip r:embed="rId3">
+            <a:extLst>
+              <a:ext uri="{28A0092B-C50C-407E-A947-70E740481C1C}">
+                <a14:useLocalDpi xmlns:a14="http://schemas.microsoft.com/office/drawing/2010/main" val="0"/>
+              </a:ext>
+            </a:extLst>
+          </a:blip>
+          <a:srcRect/>
+          <a:stretch>
+            <a:fillRect/>
+          </a:stretch>
+        </p:blipFill>
+        <p:spPr bwMode="auto">
+          <a:xfrm>
+            <a:off x="10555200" y="397497"/>
+            <a:ext cx="1116982" cy="1116982"/>
+          </a:xfrm>
+          <a:prstGeom prst="rect">
+            <a:avLst/>
+          </a:prstGeom>
+          <a:noFill/>
+          <a:extLst>
+            <a:ext uri="{909E8E84-426E-40DD-AFC4-6F175D3DCCD1}">
+              <a14:hiddenFill xmlns:a14="http://schemas.microsoft.com/office/drawing/2010/main">
+                <a:solidFill>
+                  <a:srgbClr val="FFFFFF"/>
+                </a:solidFill>
+              </a14:hiddenFill>
+            </a:ext>
+          </a:extLst>
+        </p:spPr>
+      </p:pic>
+      <p:pic>
+        <p:nvPicPr>
+          <p:cNvPr id="7" name="Picture 6" descr="Bildergebnis fÃ¼r oauth icon">
+            <a:extLst>
+              <a:ext uri="{FF2B5EF4-FFF2-40B4-BE49-F238E27FC236}">
+                <a16:creationId xmlns:a16="http://schemas.microsoft.com/office/drawing/2014/main" id="{BB4617E3-42A7-4ED5-A8F8-C058C298F3BD}"/>
+              </a:ext>
+            </a:extLst>
+          </p:cNvPr>
+          <p:cNvPicPr>
+            <a:picLocks noChangeAspect="1" noChangeArrowheads="1"/>
+          </p:cNvPicPr>
+          <p:nvPr/>
+        </p:nvPicPr>
+        <p:blipFill>
+          <a:blip r:embed="rId4" cstate="hqprint">
+            <a:extLst>
+              <a:ext uri="{28A0092B-C50C-407E-A947-70E740481C1C}">
+                <a14:useLocalDpi xmlns:a14="http://schemas.microsoft.com/office/drawing/2010/main" val="0"/>
+              </a:ext>
+            </a:extLst>
+          </a:blip>
+          <a:srcRect/>
+          <a:stretch>
+            <a:fillRect/>
+          </a:stretch>
+        </p:blipFill>
+        <p:spPr bwMode="auto">
+          <a:xfrm>
+            <a:off x="9193125" y="360861"/>
+            <a:ext cx="1195091" cy="1190253"/>
+          </a:xfrm>
+          <a:prstGeom prst="rect">
+            <a:avLst/>
+          </a:prstGeom>
+          <a:noFill/>
+          <a:extLst>
+            <a:ext uri="{909E8E84-426E-40DD-AFC4-6F175D3DCCD1}">
+              <a14:hiddenFill xmlns:a14="http://schemas.microsoft.com/office/drawing/2010/main">
+                <a:solidFill>
+                  <a:srgbClr val="FFFFFF"/>
+                </a:solidFill>
+              </a14:hiddenFill>
+            </a:ext>
+          </a:extLst>
+        </p:spPr>
+      </p:pic>
+    </p:spTree>
+    <p:extLst>
+      <p:ext uri="{BB962C8B-B14F-4D97-AF65-F5344CB8AC3E}">
+        <p14:creationId xmlns:p14="http://schemas.microsoft.com/office/powerpoint/2010/main" val="3631666557"/>
+      </p:ext>
+    </p:extLst>
+  </p:cSld>
+  <p:clrMapOvr>
+    <a:masterClrMapping/>
+  </p:clrMapOvr>
+</p:sld>
+</file>
+
+<file path=ppt/slides/slide48.xml><?xml version="1.0" encoding="utf-8"?>
+<p:sld xmlns:a="http://schemas.openxmlformats.org/drawingml/2006/main" xmlns:r="http://schemas.openxmlformats.org/officeDocument/2006/relationships" xmlns:p="http://schemas.openxmlformats.org/presentationml/2006/main">
+  <p:cSld>
+    <p:spTree>
+      <p:nvGrpSpPr>
+        <p:cNvPr id="1" name=""/>
+        <p:cNvGrpSpPr/>
+        <p:nvPr/>
+      </p:nvGrpSpPr>
+      <p:grpSpPr>
+        <a:xfrm>
+          <a:off x="0" y="0"/>
+          <a:ext cx="0" cy="0"/>
+          <a:chOff x="0" y="0"/>
+          <a:chExt cx="0" cy="0"/>
+        </a:xfrm>
+      </p:grpSpPr>
+      <p:sp>
+        <p:nvSpPr>
           <p:cNvPr id="57" name="Arrow: Right 56">
             <a:extLst>
               <a:ext uri="{FF2B5EF4-FFF2-40B4-BE49-F238E27FC236}">
@@ -40291,7 +41503,7 @@
 </p:sld>
 </file>
 
-<file path=ppt/slides/slide47.xml><?xml version="1.0" encoding="utf-8"?>
+<file path=ppt/slides/slide49.xml><?xml version="1.0" encoding="utf-8"?>
 <p:sld xmlns:a="http://schemas.openxmlformats.org/drawingml/2006/main" xmlns:r="http://schemas.openxmlformats.org/officeDocument/2006/relationships" xmlns:p="http://schemas.openxmlformats.org/presentationml/2006/main">
   <p:cSld>
     <p:spTree>
@@ -41707,1682 +42919,6 @@
     <p:extLst>
       <p:ext uri="{BB962C8B-B14F-4D97-AF65-F5344CB8AC3E}">
         <p14:creationId xmlns:p14="http://schemas.microsoft.com/office/powerpoint/2010/main" val="3746393778"/>
-      </p:ext>
-    </p:extLst>
-  </p:cSld>
-  <p:clrMapOvr>
-    <a:masterClrMapping/>
-  </p:clrMapOvr>
-</p:sld>
-</file>
-
-<file path=ppt/slides/slide48.xml><?xml version="1.0" encoding="utf-8"?>
-<p:sld xmlns:a="http://schemas.openxmlformats.org/drawingml/2006/main" xmlns:r="http://schemas.openxmlformats.org/officeDocument/2006/relationships" xmlns:p="http://schemas.openxmlformats.org/presentationml/2006/main">
-  <p:cSld>
-    <p:spTree>
-      <p:nvGrpSpPr>
-        <p:cNvPr id="1" name=""/>
-        <p:cNvGrpSpPr/>
-        <p:nvPr/>
-      </p:nvGrpSpPr>
-      <p:grpSpPr>
-        <a:xfrm>
-          <a:off x="0" y="0"/>
-          <a:ext cx="0" cy="0"/>
-          <a:chOff x="0" y="0"/>
-          <a:chExt cx="0" cy="0"/>
-        </a:xfrm>
-      </p:grpSpPr>
-      <p:sp>
-        <p:nvSpPr>
-          <p:cNvPr id="2" name="Title 1">
-            <a:extLst>
-              <a:ext uri="{FF2B5EF4-FFF2-40B4-BE49-F238E27FC236}">
-                <a16:creationId xmlns:a16="http://schemas.microsoft.com/office/drawing/2014/main" id="{348397C1-A147-42F6-8AF5-33AF5868C7CC}"/>
-              </a:ext>
-            </a:extLst>
-          </p:cNvPr>
-          <p:cNvSpPr>
-            <a:spLocks noGrp="1"/>
-          </p:cNvSpPr>
-          <p:nvPr>
-            <p:ph type="title"/>
-          </p:nvPr>
-        </p:nvSpPr>
-        <p:spPr/>
-        <p:txBody>
-          <a:bodyPr/>
-          <a:lstStyle/>
-          <a:p>
-            <a:r>
-              <a:rPr lang="de-AT" dirty="0"/>
-              <a:t>Zusammenfassung Grant/Flow Features</a:t>
-            </a:r>
-            <a:endParaRPr lang="en-US" dirty="0"/>
-          </a:p>
-        </p:txBody>
-      </p:sp>
-      <p:graphicFrame>
-        <p:nvGraphicFramePr>
-          <p:cNvPr id="3" name="Table 2">
-            <a:extLst>
-              <a:ext uri="{FF2B5EF4-FFF2-40B4-BE49-F238E27FC236}">
-                <a16:creationId xmlns:a16="http://schemas.microsoft.com/office/drawing/2014/main" id="{92A1B128-AAB2-47F0-9CD1-9CCC30105557}"/>
-              </a:ext>
-            </a:extLst>
-          </p:cNvPr>
-          <p:cNvGraphicFramePr>
-            <a:graphicFrameLocks noGrp="1"/>
-          </p:cNvGraphicFramePr>
-          <p:nvPr>
-            <p:extLst>
-              <p:ext uri="{D42A27DB-BD31-4B8C-83A1-F6EECF244321}">
-                <p14:modId xmlns:p14="http://schemas.microsoft.com/office/powerpoint/2010/main" val="2392915148"/>
-              </p:ext>
-            </p:extLst>
-          </p:nvPr>
-        </p:nvGraphicFramePr>
-        <p:xfrm>
-          <a:off x="838200" y="1350869"/>
-          <a:ext cx="10440003" cy="5245549"/>
-        </p:xfrm>
-        <a:graphic>
-          <a:graphicData uri="http://schemas.openxmlformats.org/drawingml/2006/table">
-            <a:tbl>
-              <a:tblPr firstRow="1" bandRow="1">
-                <a:tableStyleId>{5940675A-B579-460E-94D1-54222C63F5DA}</a:tableStyleId>
-              </a:tblPr>
-              <a:tblGrid>
-                <a:gridCol w="1664855">
-                  <a:extLst>
-                    <a:ext uri="{9D8B030D-6E8A-4147-A177-3AD203B41FA5}">
-                      <a16:colId xmlns:a16="http://schemas.microsoft.com/office/drawing/2014/main" val="1929636500"/>
-                    </a:ext>
-                  </a:extLst>
-                </a:gridCol>
-                <a:gridCol w="1318003">
-                  <a:extLst>
-                    <a:ext uri="{9D8B030D-6E8A-4147-A177-3AD203B41FA5}">
-                      <a16:colId xmlns:a16="http://schemas.microsoft.com/office/drawing/2014/main" val="395898648"/>
-                    </a:ext>
-                  </a:extLst>
-                </a:gridCol>
-                <a:gridCol w="1491429">
-                  <a:extLst>
-                    <a:ext uri="{9D8B030D-6E8A-4147-A177-3AD203B41FA5}">
-                      <a16:colId xmlns:a16="http://schemas.microsoft.com/office/drawing/2014/main" val="1690800767"/>
-                    </a:ext>
-                  </a:extLst>
-                </a:gridCol>
-                <a:gridCol w="1491429">
-                  <a:extLst>
-                    <a:ext uri="{9D8B030D-6E8A-4147-A177-3AD203B41FA5}">
-                      <a16:colId xmlns:a16="http://schemas.microsoft.com/office/drawing/2014/main" val="3240070001"/>
-                    </a:ext>
-                  </a:extLst>
-                </a:gridCol>
-                <a:gridCol w="1491429">
-                  <a:extLst>
-                    <a:ext uri="{9D8B030D-6E8A-4147-A177-3AD203B41FA5}">
-                      <a16:colId xmlns:a16="http://schemas.microsoft.com/office/drawing/2014/main" val="116783287"/>
-                    </a:ext>
-                  </a:extLst>
-                </a:gridCol>
-                <a:gridCol w="1491429">
-                  <a:extLst>
-                    <a:ext uri="{9D8B030D-6E8A-4147-A177-3AD203B41FA5}">
-                      <a16:colId xmlns:a16="http://schemas.microsoft.com/office/drawing/2014/main" val="492657174"/>
-                    </a:ext>
-                  </a:extLst>
-                </a:gridCol>
-                <a:gridCol w="1491429">
-                  <a:extLst>
-                    <a:ext uri="{9D8B030D-6E8A-4147-A177-3AD203B41FA5}">
-                      <a16:colId xmlns:a16="http://schemas.microsoft.com/office/drawing/2014/main" val="847277139"/>
-                    </a:ext>
-                  </a:extLst>
-                </a:gridCol>
-              </a:tblGrid>
-              <a:tr h="652650">
-                <a:tc>
-                  <a:txBody>
-                    <a:bodyPr/>
-                    <a:lstStyle/>
-                    <a:p>
-                      <a:pPr algn="ctr"/>
-                      <a:endParaRPr lang="en-US" dirty="0">
-                        <a:solidFill>
-                          <a:schemeClr val="bg1"/>
-                        </a:solidFill>
-                      </a:endParaRPr>
-                    </a:p>
-                  </a:txBody>
-                  <a:tcPr anchor="ctr">
-                    <a:solidFill>
-                      <a:schemeClr val="tx1"/>
-                    </a:solidFill>
-                  </a:tcPr>
-                </a:tc>
-                <a:tc>
-                  <a:txBody>
-                    <a:bodyPr/>
-                    <a:lstStyle/>
-                    <a:p>
-                      <a:pPr algn="ctr"/>
-                      <a:r>
-                        <a:rPr lang="de-AT" dirty="0">
-                          <a:solidFill>
-                            <a:schemeClr val="bg1"/>
-                          </a:solidFill>
-                        </a:rPr>
-                        <a:t>Client </a:t>
-                      </a:r>
-                      <a:r>
-                        <a:rPr lang="de-AT" dirty="0" err="1">
-                          <a:solidFill>
-                            <a:schemeClr val="bg1"/>
-                          </a:solidFill>
-                        </a:rPr>
-                        <a:t>Credential</a:t>
-                      </a:r>
-                      <a:r>
-                        <a:rPr lang="de-AT" dirty="0">
-                          <a:solidFill>
-                            <a:schemeClr val="bg1"/>
-                          </a:solidFill>
-                        </a:rPr>
-                        <a:t> Grant</a:t>
-                      </a:r>
-                      <a:endParaRPr lang="en-US" dirty="0">
-                        <a:solidFill>
-                          <a:schemeClr val="bg1"/>
-                        </a:solidFill>
-                      </a:endParaRPr>
-                    </a:p>
-                  </a:txBody>
-                  <a:tcPr anchor="ctr">
-                    <a:solidFill>
-                      <a:schemeClr val="tx1"/>
-                    </a:solidFill>
-                  </a:tcPr>
-                </a:tc>
-                <a:tc>
-                  <a:txBody>
-                    <a:bodyPr/>
-                    <a:lstStyle/>
-                    <a:p>
-                      <a:pPr algn="ctr"/>
-                      <a:r>
-                        <a:rPr lang="de-AT" dirty="0" err="1">
-                          <a:solidFill>
-                            <a:schemeClr val="bg1"/>
-                          </a:solidFill>
-                        </a:rPr>
-                        <a:t>Resource</a:t>
-                      </a:r>
-                      <a:r>
-                        <a:rPr lang="de-AT" dirty="0">
-                          <a:solidFill>
-                            <a:schemeClr val="bg1"/>
-                          </a:solidFill>
-                        </a:rPr>
-                        <a:t> </a:t>
-                      </a:r>
-                      <a:r>
-                        <a:rPr lang="de-AT" dirty="0" err="1">
-                          <a:solidFill>
-                            <a:schemeClr val="bg1"/>
-                          </a:solidFill>
-                        </a:rPr>
-                        <a:t>Owner</a:t>
-                      </a:r>
-                      <a:r>
-                        <a:rPr lang="de-AT" dirty="0">
-                          <a:solidFill>
-                            <a:schemeClr val="bg1"/>
-                          </a:solidFill>
-                        </a:rPr>
-                        <a:t> </a:t>
-                      </a:r>
-                      <a:r>
-                        <a:rPr lang="de-AT" dirty="0" err="1">
-                          <a:solidFill>
-                            <a:schemeClr val="bg1"/>
-                          </a:solidFill>
-                        </a:rPr>
-                        <a:t>Pwd</a:t>
-                      </a:r>
-                      <a:r>
-                        <a:rPr lang="de-AT" dirty="0">
-                          <a:solidFill>
-                            <a:schemeClr val="bg1"/>
-                          </a:solidFill>
-                        </a:rPr>
-                        <a:t> Grant</a:t>
-                      </a:r>
-                      <a:endParaRPr lang="en-US" dirty="0">
-                        <a:solidFill>
-                          <a:schemeClr val="bg1"/>
-                        </a:solidFill>
-                      </a:endParaRPr>
-                    </a:p>
-                  </a:txBody>
-                  <a:tcPr anchor="ctr">
-                    <a:solidFill>
-                      <a:schemeClr val="tx1"/>
-                    </a:solidFill>
-                  </a:tcPr>
-                </a:tc>
-                <a:tc>
-                  <a:txBody>
-                    <a:bodyPr/>
-                    <a:lstStyle/>
-                    <a:p>
-                      <a:pPr algn="ctr"/>
-                      <a:r>
-                        <a:rPr lang="de-AT" dirty="0" err="1">
-                          <a:solidFill>
-                            <a:schemeClr val="bg1"/>
-                          </a:solidFill>
-                        </a:rPr>
-                        <a:t>Authorization</a:t>
-                      </a:r>
-                      <a:r>
-                        <a:rPr lang="de-AT" dirty="0">
-                          <a:solidFill>
-                            <a:schemeClr val="bg1"/>
-                          </a:solidFill>
-                        </a:rPr>
-                        <a:t> Code Flow</a:t>
-                      </a:r>
-                      <a:endParaRPr lang="en-US" dirty="0">
-                        <a:solidFill>
-                          <a:schemeClr val="bg1"/>
-                        </a:solidFill>
-                      </a:endParaRPr>
-                    </a:p>
-                  </a:txBody>
-                  <a:tcPr anchor="ctr">
-                    <a:solidFill>
-                      <a:schemeClr val="tx1"/>
-                    </a:solidFill>
-                  </a:tcPr>
-                </a:tc>
-                <a:tc>
-                  <a:txBody>
-                    <a:bodyPr/>
-                    <a:lstStyle/>
-                    <a:p>
-                      <a:pPr algn="ctr"/>
-                      <a:r>
-                        <a:rPr lang="de-AT" dirty="0" err="1">
-                          <a:solidFill>
-                            <a:schemeClr val="bg1"/>
-                          </a:solidFill>
-                        </a:rPr>
-                        <a:t>Implict</a:t>
-                      </a:r>
-                      <a:r>
-                        <a:rPr lang="de-AT" dirty="0">
-                          <a:solidFill>
-                            <a:schemeClr val="bg1"/>
-                          </a:solidFill>
-                        </a:rPr>
-                        <a:t> Flow</a:t>
-                      </a:r>
-                      <a:endParaRPr lang="en-US" dirty="0">
-                        <a:solidFill>
-                          <a:schemeClr val="bg1"/>
-                        </a:solidFill>
-                      </a:endParaRPr>
-                    </a:p>
-                  </a:txBody>
-                  <a:tcPr anchor="ctr">
-                    <a:solidFill>
-                      <a:schemeClr val="tx1"/>
-                    </a:solidFill>
-                  </a:tcPr>
-                </a:tc>
-                <a:tc>
-                  <a:txBody>
-                    <a:bodyPr/>
-                    <a:lstStyle/>
-                    <a:p>
-                      <a:pPr algn="ctr"/>
-                      <a:r>
-                        <a:rPr lang="de-AT" dirty="0">
-                          <a:solidFill>
-                            <a:schemeClr val="bg1"/>
-                          </a:solidFill>
-                        </a:rPr>
-                        <a:t>Hybrid Flow</a:t>
-                      </a:r>
-                      <a:endParaRPr lang="en-US" dirty="0">
-                        <a:solidFill>
-                          <a:schemeClr val="bg1"/>
-                        </a:solidFill>
-                      </a:endParaRPr>
-                    </a:p>
-                  </a:txBody>
-                  <a:tcPr anchor="ctr">
-                    <a:solidFill>
-                      <a:schemeClr val="tx1"/>
-                    </a:solidFill>
-                  </a:tcPr>
-                </a:tc>
-                <a:tc>
-                  <a:txBody>
-                    <a:bodyPr/>
-                    <a:lstStyle/>
-                    <a:p>
-                      <a:pPr algn="ctr"/>
-                      <a:r>
-                        <a:rPr lang="de-AT" dirty="0">
-                          <a:solidFill>
-                            <a:schemeClr val="bg1"/>
-                          </a:solidFill>
-                        </a:rPr>
-                        <a:t>Device Auth Grant</a:t>
-                      </a:r>
-                      <a:endParaRPr lang="en-US" dirty="0">
-                        <a:solidFill>
-                          <a:schemeClr val="bg1"/>
-                        </a:solidFill>
-                      </a:endParaRPr>
-                    </a:p>
-                  </a:txBody>
-                  <a:tcPr anchor="ctr">
-                    <a:solidFill>
-                      <a:schemeClr val="tx1"/>
-                    </a:solidFill>
-                  </a:tcPr>
-                </a:tc>
-                <a:extLst>
-                  <a:ext uri="{0D108BD9-81ED-4DB2-BD59-A6C34878D82A}">
-                    <a16:rowId xmlns:a16="http://schemas.microsoft.com/office/drawing/2014/main" val="1928875511"/>
-                  </a:ext>
-                </a:extLst>
-              </a:tr>
-              <a:tr h="825139">
-                <a:tc>
-                  <a:txBody>
-                    <a:bodyPr/>
-                    <a:lstStyle/>
-                    <a:p>
-                      <a:pPr algn="ctr"/>
-                      <a:r>
-                        <a:rPr lang="de-AT" dirty="0"/>
-                        <a:t>Alle Tokens von </a:t>
-                      </a:r>
-                      <a:r>
-                        <a:rPr lang="de-AT" i="1" dirty="0" err="1"/>
-                        <a:t>Authorization</a:t>
-                      </a:r>
-                      <a:r>
-                        <a:rPr lang="de-AT" i="1" dirty="0"/>
-                        <a:t> Endpunkt</a:t>
-                      </a:r>
-                      <a:endParaRPr lang="en-US" i="1" dirty="0"/>
-                    </a:p>
-                  </a:txBody>
-                  <a:tcPr anchor="ctr">
-                    <a:solidFill>
-                      <a:schemeClr val="bg1">
-                        <a:lumMod val="85000"/>
-                      </a:schemeClr>
-                    </a:solidFill>
-                  </a:tcPr>
-                </a:tc>
-                <a:tc>
-                  <a:txBody>
-                    <a:bodyPr/>
-                    <a:lstStyle/>
-                    <a:p>
-                      <a:pPr algn="ctr"/>
-                      <a:endParaRPr lang="en-US" dirty="0"/>
-                    </a:p>
-                  </a:txBody>
-                  <a:tcPr anchor="ctr"/>
-                </a:tc>
-                <a:tc>
-                  <a:txBody>
-                    <a:bodyPr/>
-                    <a:lstStyle/>
-                    <a:p>
-                      <a:pPr algn="ctr"/>
-                      <a:endParaRPr lang="en-US" dirty="0"/>
-                    </a:p>
-                  </a:txBody>
-                  <a:tcPr anchor="ctr"/>
-                </a:tc>
-                <a:tc>
-                  <a:txBody>
-                    <a:bodyPr/>
-                    <a:lstStyle/>
-                    <a:p>
-                      <a:pPr algn="ctr"/>
-                      <a:endParaRPr lang="en-US" dirty="0"/>
-                    </a:p>
-                  </a:txBody>
-                  <a:tcPr anchor="ctr"/>
-                </a:tc>
-                <a:tc>
-                  <a:txBody>
-                    <a:bodyPr/>
-                    <a:lstStyle/>
-                    <a:p>
-                      <a:pPr algn="ctr"/>
-                      <a:r>
-                        <a:rPr lang="de-AT" dirty="0"/>
-                        <a:t>X</a:t>
-                      </a:r>
-                      <a:endParaRPr lang="en-US" dirty="0"/>
-                    </a:p>
-                  </a:txBody>
-                  <a:tcPr anchor="ctr"/>
-                </a:tc>
-                <a:tc>
-                  <a:txBody>
-                    <a:bodyPr/>
-                    <a:lstStyle/>
-                    <a:p>
-                      <a:pPr algn="ctr"/>
-                      <a:endParaRPr lang="en-US" dirty="0"/>
-                    </a:p>
-                  </a:txBody>
-                  <a:tcPr anchor="ctr"/>
-                </a:tc>
-                <a:tc>
-                  <a:txBody>
-                    <a:bodyPr/>
-                    <a:lstStyle/>
-                    <a:p>
-                      <a:pPr algn="ctr"/>
-                      <a:endParaRPr lang="en-US" dirty="0"/>
-                    </a:p>
-                  </a:txBody>
-                  <a:tcPr anchor="ctr"/>
-                </a:tc>
-                <a:extLst>
-                  <a:ext uri="{0D108BD9-81ED-4DB2-BD59-A6C34878D82A}">
-                    <a16:rowId xmlns:a16="http://schemas.microsoft.com/office/drawing/2014/main" val="1320869910"/>
-                  </a:ext>
-                </a:extLst>
-              </a:tr>
-              <a:tr h="904392">
-                <a:tc>
-                  <a:txBody>
-                    <a:bodyPr/>
-                    <a:lstStyle/>
-                    <a:p>
-                      <a:pPr marL="0" marR="0" lvl="0" indent="0" algn="ctr" defTabSz="914400" rtl="0" eaLnBrk="1" fontAlgn="auto" latinLnBrk="0" hangingPunct="1">
-                        <a:lnSpc>
-                          <a:spcPct val="100000"/>
-                        </a:lnSpc>
-                        <a:spcBef>
-                          <a:spcPts val="0"/>
-                        </a:spcBef>
-                        <a:spcAft>
-                          <a:spcPts val="0"/>
-                        </a:spcAft>
-                        <a:buClrTx/>
-                        <a:buSzTx/>
-                        <a:buFontTx/>
-                        <a:buNone/>
-                        <a:tabLst/>
-                        <a:defRPr/>
-                      </a:pPr>
-                      <a:r>
-                        <a:rPr lang="de-AT" dirty="0"/>
-                        <a:t>Alle Tokens von </a:t>
-                      </a:r>
-                      <a:r>
-                        <a:rPr lang="de-AT" i="1" dirty="0"/>
-                        <a:t>Token Endpunkt</a:t>
-                      </a:r>
-                      <a:endParaRPr lang="en-US" i="1" dirty="0"/>
-                    </a:p>
-                  </a:txBody>
-                  <a:tcPr anchor="ctr">
-                    <a:solidFill>
-                      <a:schemeClr val="bg1">
-                        <a:lumMod val="85000"/>
-                      </a:schemeClr>
-                    </a:solidFill>
-                  </a:tcPr>
-                </a:tc>
-                <a:tc>
-                  <a:txBody>
-                    <a:bodyPr/>
-                    <a:lstStyle/>
-                    <a:p>
-                      <a:pPr algn="ctr"/>
-                      <a:r>
-                        <a:rPr lang="de-AT" dirty="0"/>
-                        <a:t>X</a:t>
-                      </a:r>
-                      <a:endParaRPr lang="en-US" dirty="0"/>
-                    </a:p>
-                  </a:txBody>
-                  <a:tcPr anchor="ctr"/>
-                </a:tc>
-                <a:tc>
-                  <a:txBody>
-                    <a:bodyPr/>
-                    <a:lstStyle/>
-                    <a:p>
-                      <a:pPr algn="ctr"/>
-                      <a:r>
-                        <a:rPr lang="de-AT" dirty="0"/>
-                        <a:t>X</a:t>
-                      </a:r>
-                      <a:endParaRPr lang="en-US" dirty="0"/>
-                    </a:p>
-                  </a:txBody>
-                  <a:tcPr anchor="ctr"/>
-                </a:tc>
-                <a:tc>
-                  <a:txBody>
-                    <a:bodyPr/>
-                    <a:lstStyle/>
-                    <a:p>
-                      <a:pPr algn="ctr"/>
-                      <a:r>
-                        <a:rPr lang="de-AT" dirty="0"/>
-                        <a:t>X</a:t>
-                      </a:r>
-                      <a:endParaRPr lang="en-US" dirty="0"/>
-                    </a:p>
-                  </a:txBody>
-                  <a:tcPr anchor="ctr"/>
-                </a:tc>
-                <a:tc>
-                  <a:txBody>
-                    <a:bodyPr/>
-                    <a:lstStyle/>
-                    <a:p>
-                      <a:pPr algn="ctr"/>
-                      <a:endParaRPr lang="en-US" dirty="0"/>
-                    </a:p>
-                  </a:txBody>
-                  <a:tcPr anchor="ctr"/>
-                </a:tc>
-                <a:tc>
-                  <a:txBody>
-                    <a:bodyPr/>
-                    <a:lstStyle/>
-                    <a:p>
-                      <a:pPr algn="ctr"/>
-                      <a:endParaRPr lang="en-US" dirty="0"/>
-                    </a:p>
-                  </a:txBody>
-                  <a:tcPr anchor="ctr"/>
-                </a:tc>
-                <a:tc>
-                  <a:txBody>
-                    <a:bodyPr/>
-                    <a:lstStyle/>
-                    <a:p>
-                      <a:pPr algn="ctr"/>
-                      <a:r>
-                        <a:rPr lang="de-AT" dirty="0"/>
-                        <a:t>X</a:t>
-                      </a:r>
-                      <a:endParaRPr lang="en-US" dirty="0"/>
-                    </a:p>
-                  </a:txBody>
-                  <a:tcPr anchor="ctr"/>
-                </a:tc>
-                <a:extLst>
-                  <a:ext uri="{0D108BD9-81ED-4DB2-BD59-A6C34878D82A}">
-                    <a16:rowId xmlns:a16="http://schemas.microsoft.com/office/drawing/2014/main" val="685321953"/>
-                  </a:ext>
-                </a:extLst>
-              </a:tr>
-              <a:tr h="904392">
-                <a:tc>
-                  <a:txBody>
-                    <a:bodyPr/>
-                    <a:lstStyle/>
-                    <a:p>
-                      <a:pPr marL="0" marR="0" lvl="0" indent="0" algn="ctr" defTabSz="914400" rtl="0" eaLnBrk="1" fontAlgn="auto" latinLnBrk="0" hangingPunct="1">
-                        <a:lnSpc>
-                          <a:spcPct val="100000"/>
-                        </a:lnSpc>
-                        <a:spcBef>
-                          <a:spcPts val="0"/>
-                        </a:spcBef>
-                        <a:spcAft>
-                          <a:spcPts val="0"/>
-                        </a:spcAft>
-                        <a:buClrTx/>
-                        <a:buSzTx/>
-                        <a:buFontTx/>
-                        <a:buNone/>
-                        <a:tabLst/>
-                        <a:defRPr/>
-                      </a:pPr>
-                      <a:r>
-                        <a:rPr lang="de-AT" i="0" dirty="0"/>
-                        <a:t>Tokens über User Agent gesendet</a:t>
-                      </a:r>
-                      <a:endParaRPr lang="en-US" i="0" dirty="0"/>
-                    </a:p>
-                  </a:txBody>
-                  <a:tcPr anchor="ctr">
-                    <a:solidFill>
-                      <a:schemeClr val="bg1">
-                        <a:lumMod val="85000"/>
-                      </a:schemeClr>
-                    </a:solidFill>
-                  </a:tcPr>
-                </a:tc>
-                <a:tc>
-                  <a:txBody>
-                    <a:bodyPr/>
-                    <a:lstStyle/>
-                    <a:p>
-                      <a:pPr algn="ctr"/>
-                      <a:endParaRPr lang="de-AT" dirty="0"/>
-                    </a:p>
-                  </a:txBody>
-                  <a:tcPr anchor="ctr"/>
-                </a:tc>
-                <a:tc>
-                  <a:txBody>
-                    <a:bodyPr/>
-                    <a:lstStyle/>
-                    <a:p>
-                      <a:pPr algn="ctr"/>
-                      <a:endParaRPr lang="en-US" dirty="0"/>
-                    </a:p>
-                  </a:txBody>
-                  <a:tcPr anchor="ctr"/>
-                </a:tc>
-                <a:tc>
-                  <a:txBody>
-                    <a:bodyPr/>
-                    <a:lstStyle/>
-                    <a:p>
-                      <a:pPr algn="ctr"/>
-                      <a:endParaRPr lang="en-US" dirty="0"/>
-                    </a:p>
-                  </a:txBody>
-                  <a:tcPr anchor="ctr"/>
-                </a:tc>
-                <a:tc>
-                  <a:txBody>
-                    <a:bodyPr/>
-                    <a:lstStyle/>
-                    <a:p>
-                      <a:pPr algn="ctr"/>
-                      <a:r>
-                        <a:rPr lang="de-AT" dirty="0"/>
-                        <a:t>X</a:t>
-                      </a:r>
-                      <a:endParaRPr lang="en-US" dirty="0"/>
-                    </a:p>
-                  </a:txBody>
-                  <a:tcPr anchor="ctr"/>
-                </a:tc>
-                <a:tc>
-                  <a:txBody>
-                    <a:bodyPr/>
-                    <a:lstStyle/>
-                    <a:p>
-                      <a:pPr algn="ctr"/>
-                      <a:r>
-                        <a:rPr lang="de-AT" dirty="0"/>
-                        <a:t>X</a:t>
-                      </a:r>
-                      <a:endParaRPr lang="en-US" dirty="0"/>
-                    </a:p>
-                  </a:txBody>
-                  <a:tcPr anchor="ctr"/>
-                </a:tc>
-                <a:tc>
-                  <a:txBody>
-                    <a:bodyPr/>
-                    <a:lstStyle/>
-                    <a:p>
-                      <a:pPr algn="ctr"/>
-                      <a:endParaRPr lang="en-US" dirty="0"/>
-                    </a:p>
-                  </a:txBody>
-                  <a:tcPr anchor="ctr"/>
-                </a:tc>
-                <a:extLst>
-                  <a:ext uri="{0D108BD9-81ED-4DB2-BD59-A6C34878D82A}">
-                    <a16:rowId xmlns:a16="http://schemas.microsoft.com/office/drawing/2014/main" val="356802342"/>
-                  </a:ext>
-                </a:extLst>
-              </a:tr>
-              <a:tr h="683557">
-                <a:tc>
-                  <a:txBody>
-                    <a:bodyPr/>
-                    <a:lstStyle/>
-                    <a:p>
-                      <a:pPr marL="0" marR="0" lvl="0" indent="0" algn="ctr" defTabSz="914400" rtl="0" eaLnBrk="1" fontAlgn="auto" latinLnBrk="0" hangingPunct="1">
-                        <a:lnSpc>
-                          <a:spcPct val="100000"/>
-                        </a:lnSpc>
-                        <a:spcBef>
-                          <a:spcPts val="0"/>
-                        </a:spcBef>
-                        <a:spcAft>
-                          <a:spcPts val="0"/>
-                        </a:spcAft>
-                        <a:buClrTx/>
-                        <a:buSzTx/>
-                        <a:buFontTx/>
-                        <a:buNone/>
-                        <a:tabLst/>
-                        <a:defRPr/>
-                      </a:pPr>
-                      <a:r>
-                        <a:rPr lang="de-AT" i="1" dirty="0"/>
-                        <a:t>Refresh Token </a:t>
-                      </a:r>
-                      <a:r>
-                        <a:rPr lang="de-AT" i="0" dirty="0"/>
-                        <a:t>unterstützt</a:t>
-                      </a:r>
-                      <a:endParaRPr lang="en-US" i="0" dirty="0"/>
-                    </a:p>
-                  </a:txBody>
-                  <a:tcPr anchor="ctr">
-                    <a:solidFill>
-                      <a:schemeClr val="bg1">
-                        <a:lumMod val="85000"/>
-                      </a:schemeClr>
-                    </a:solidFill>
-                  </a:tcPr>
-                </a:tc>
-                <a:tc>
-                  <a:txBody>
-                    <a:bodyPr/>
-                    <a:lstStyle/>
-                    <a:p>
-                      <a:pPr algn="ctr"/>
-                      <a:endParaRPr lang="de-AT" dirty="0"/>
-                    </a:p>
-                  </a:txBody>
-                  <a:tcPr anchor="ctr"/>
-                </a:tc>
-                <a:tc>
-                  <a:txBody>
-                    <a:bodyPr/>
-                    <a:lstStyle/>
-                    <a:p>
-                      <a:pPr algn="ctr"/>
-                      <a:r>
-                        <a:rPr lang="de-AT" dirty="0"/>
-                        <a:t>X</a:t>
-                      </a:r>
-                      <a:endParaRPr lang="en-US" dirty="0"/>
-                    </a:p>
-                  </a:txBody>
-                  <a:tcPr anchor="ctr"/>
-                </a:tc>
-                <a:tc>
-                  <a:txBody>
-                    <a:bodyPr/>
-                    <a:lstStyle/>
-                    <a:p>
-                      <a:pPr algn="ctr"/>
-                      <a:r>
-                        <a:rPr lang="de-AT" dirty="0"/>
-                        <a:t>X</a:t>
-                      </a:r>
-                      <a:endParaRPr lang="en-US" dirty="0"/>
-                    </a:p>
-                  </a:txBody>
-                  <a:tcPr anchor="ctr"/>
-                </a:tc>
-                <a:tc>
-                  <a:txBody>
-                    <a:bodyPr/>
-                    <a:lstStyle/>
-                    <a:p>
-                      <a:pPr algn="ctr"/>
-                      <a:endParaRPr lang="en-US" dirty="0"/>
-                    </a:p>
-                  </a:txBody>
-                  <a:tcPr anchor="ctr"/>
-                </a:tc>
-                <a:tc>
-                  <a:txBody>
-                    <a:bodyPr/>
-                    <a:lstStyle/>
-                    <a:p>
-                      <a:pPr algn="ctr"/>
-                      <a:r>
-                        <a:rPr lang="de-AT" dirty="0"/>
-                        <a:t>X</a:t>
-                      </a:r>
-                    </a:p>
-                  </a:txBody>
-                  <a:tcPr anchor="ctr"/>
-                </a:tc>
-                <a:tc>
-                  <a:txBody>
-                    <a:bodyPr/>
-                    <a:lstStyle/>
-                    <a:p>
-                      <a:pPr algn="ctr"/>
-                      <a:r>
-                        <a:rPr lang="de-AT" dirty="0"/>
-                        <a:t>X</a:t>
-                      </a:r>
-                    </a:p>
-                  </a:txBody>
-                  <a:tcPr anchor="ctr"/>
-                </a:tc>
-                <a:extLst>
-                  <a:ext uri="{0D108BD9-81ED-4DB2-BD59-A6C34878D82A}">
-                    <a16:rowId xmlns:a16="http://schemas.microsoft.com/office/drawing/2014/main" val="1447987830"/>
-                  </a:ext>
-                </a:extLst>
-              </a:tr>
-              <a:tr h="683557">
-                <a:tc>
-                  <a:txBody>
-                    <a:bodyPr/>
-                    <a:lstStyle/>
-                    <a:p>
-                      <a:pPr marL="0" marR="0" lvl="0" indent="0" algn="ctr" defTabSz="914400" rtl="0" eaLnBrk="1" fontAlgn="auto" latinLnBrk="0" hangingPunct="1">
-                        <a:lnSpc>
-                          <a:spcPct val="100000"/>
-                        </a:lnSpc>
-                        <a:spcBef>
-                          <a:spcPts val="0"/>
-                        </a:spcBef>
-                        <a:spcAft>
-                          <a:spcPts val="0"/>
-                        </a:spcAft>
-                        <a:buClrTx/>
-                        <a:buSzTx/>
-                        <a:buFontTx/>
-                        <a:buNone/>
-                        <a:tabLst/>
-                        <a:defRPr/>
-                      </a:pPr>
-                      <a:r>
-                        <a:rPr lang="de-AT" i="0" dirty="0"/>
-                        <a:t>Token via ein einziges </a:t>
-                      </a:r>
-                      <a:r>
-                        <a:rPr lang="de-AT" i="0" dirty="0" err="1"/>
-                        <a:t>Roundtrip</a:t>
-                      </a:r>
-                      <a:endParaRPr lang="en-US" i="0" dirty="0"/>
-                    </a:p>
-                  </a:txBody>
-                  <a:tcPr anchor="ctr">
-                    <a:solidFill>
-                      <a:schemeClr val="bg1">
-                        <a:lumMod val="85000"/>
-                      </a:schemeClr>
-                    </a:solidFill>
-                  </a:tcPr>
-                </a:tc>
-                <a:tc>
-                  <a:txBody>
-                    <a:bodyPr/>
-                    <a:lstStyle/>
-                    <a:p>
-                      <a:pPr algn="ctr"/>
-                      <a:r>
-                        <a:rPr lang="de-AT" dirty="0"/>
-                        <a:t>X</a:t>
-                      </a:r>
-                    </a:p>
-                  </a:txBody>
-                  <a:tcPr anchor="ctr"/>
-                </a:tc>
-                <a:tc>
-                  <a:txBody>
-                    <a:bodyPr/>
-                    <a:lstStyle/>
-                    <a:p>
-                      <a:pPr algn="ctr"/>
-                      <a:r>
-                        <a:rPr lang="de-AT" dirty="0"/>
-                        <a:t>X</a:t>
-                      </a:r>
-                      <a:endParaRPr lang="en-US" dirty="0"/>
-                    </a:p>
-                  </a:txBody>
-                  <a:tcPr anchor="ctr"/>
-                </a:tc>
-                <a:tc>
-                  <a:txBody>
-                    <a:bodyPr/>
-                    <a:lstStyle/>
-                    <a:p>
-                      <a:pPr algn="ctr"/>
-                      <a:endParaRPr lang="en-US" dirty="0"/>
-                    </a:p>
-                  </a:txBody>
-                  <a:tcPr anchor="ctr"/>
-                </a:tc>
-                <a:tc>
-                  <a:txBody>
-                    <a:bodyPr/>
-                    <a:lstStyle/>
-                    <a:p>
-                      <a:pPr algn="ctr"/>
-                      <a:r>
-                        <a:rPr lang="de-AT" dirty="0"/>
-                        <a:t>X</a:t>
-                      </a:r>
-                      <a:endParaRPr lang="en-US" dirty="0"/>
-                    </a:p>
-                  </a:txBody>
-                  <a:tcPr anchor="ctr"/>
-                </a:tc>
-                <a:tc>
-                  <a:txBody>
-                    <a:bodyPr/>
-                    <a:lstStyle/>
-                    <a:p>
-                      <a:pPr algn="ctr"/>
-                      <a:endParaRPr lang="de-AT" dirty="0"/>
-                    </a:p>
-                  </a:txBody>
-                  <a:tcPr anchor="ctr"/>
-                </a:tc>
-                <a:tc>
-                  <a:txBody>
-                    <a:bodyPr/>
-                    <a:lstStyle/>
-                    <a:p>
-                      <a:pPr algn="ctr"/>
-                      <a:endParaRPr lang="de-AT" dirty="0"/>
-                    </a:p>
-                  </a:txBody>
-                  <a:tcPr anchor="ctr"/>
-                </a:tc>
-                <a:extLst>
-                  <a:ext uri="{0D108BD9-81ED-4DB2-BD59-A6C34878D82A}">
-                    <a16:rowId xmlns:a16="http://schemas.microsoft.com/office/drawing/2014/main" val="757970485"/>
-                  </a:ext>
-                </a:extLst>
-              </a:tr>
-            </a:tbl>
-          </a:graphicData>
-        </a:graphic>
-      </p:graphicFrame>
-    </p:spTree>
-    <p:extLst>
-      <p:ext uri="{BB962C8B-B14F-4D97-AF65-F5344CB8AC3E}">
-        <p14:creationId xmlns:p14="http://schemas.microsoft.com/office/powerpoint/2010/main" val="3957468252"/>
-      </p:ext>
-    </p:extLst>
-  </p:cSld>
-  <p:clrMapOvr>
-    <a:masterClrMapping/>
-  </p:clrMapOvr>
-</p:sld>
-</file>
-
-<file path=ppt/slides/slide49.xml><?xml version="1.0" encoding="utf-8"?>
-<p:sld xmlns:a="http://schemas.openxmlformats.org/drawingml/2006/main" xmlns:r="http://schemas.openxmlformats.org/officeDocument/2006/relationships" xmlns:p="http://schemas.openxmlformats.org/presentationml/2006/main">
-  <p:cSld>
-    <p:spTree>
-      <p:nvGrpSpPr>
-        <p:cNvPr id="1" name=""/>
-        <p:cNvGrpSpPr/>
-        <p:nvPr/>
-      </p:nvGrpSpPr>
-      <p:grpSpPr>
-        <a:xfrm>
-          <a:off x="0" y="0"/>
-          <a:ext cx="0" cy="0"/>
-          <a:chOff x="0" y="0"/>
-          <a:chExt cx="0" cy="0"/>
-        </a:xfrm>
-      </p:grpSpPr>
-      <p:sp>
-        <p:nvSpPr>
-          <p:cNvPr id="2" name="Title 1">
-            <a:extLst>
-              <a:ext uri="{FF2B5EF4-FFF2-40B4-BE49-F238E27FC236}">
-                <a16:creationId xmlns:a16="http://schemas.microsoft.com/office/drawing/2014/main" id="{348397C1-A147-42F6-8AF5-33AF5868C7CC}"/>
-              </a:ext>
-            </a:extLst>
-          </p:cNvPr>
-          <p:cNvSpPr>
-            <a:spLocks noGrp="1"/>
-          </p:cNvSpPr>
-          <p:nvPr>
-            <p:ph type="title"/>
-          </p:nvPr>
-        </p:nvSpPr>
-        <p:spPr/>
-        <p:txBody>
-          <a:bodyPr/>
-          <a:lstStyle/>
-          <a:p>
-            <a:r>
-              <a:rPr lang="de-AT" dirty="0"/>
-              <a:t>Zusammenfassung </a:t>
-            </a:r>
-            <a:r>
-              <a:rPr lang="de-AT" dirty="0" err="1">
-                <a:latin typeface="Consolas" panose="020B0609020204030204" pitchFamily="49" charset="0"/>
-              </a:rPr>
-              <a:t>grant_type</a:t>
-            </a:r>
-            <a:r>
-              <a:rPr lang="de-AT" sz="4000" dirty="0" err="1">
-                <a:latin typeface="+mn-lt"/>
-              </a:rPr>
-              <a:t>s</a:t>
-            </a:r>
-            <a:endParaRPr lang="en-US" dirty="0">
-              <a:latin typeface="+mn-lt"/>
-            </a:endParaRPr>
-          </a:p>
-        </p:txBody>
-      </p:sp>
-      <p:graphicFrame>
-        <p:nvGraphicFramePr>
-          <p:cNvPr id="3" name="Table 2">
-            <a:extLst>
-              <a:ext uri="{FF2B5EF4-FFF2-40B4-BE49-F238E27FC236}">
-                <a16:creationId xmlns:a16="http://schemas.microsoft.com/office/drawing/2014/main" id="{92A1B128-AAB2-47F0-9CD1-9CCC30105557}"/>
-              </a:ext>
-            </a:extLst>
-          </p:cNvPr>
-          <p:cNvGraphicFramePr>
-            <a:graphicFrameLocks noGrp="1"/>
-          </p:cNvGraphicFramePr>
-          <p:nvPr>
-            <p:extLst>
-              <p:ext uri="{D42A27DB-BD31-4B8C-83A1-F6EECF244321}">
-                <p14:modId xmlns:p14="http://schemas.microsoft.com/office/powerpoint/2010/main" val="741432363"/>
-              </p:ext>
-            </p:extLst>
-          </p:nvPr>
-        </p:nvGraphicFramePr>
-        <p:xfrm>
-          <a:off x="3897834" y="1690688"/>
-          <a:ext cx="4396332" cy="4710784"/>
-        </p:xfrm>
-        <a:graphic>
-          <a:graphicData uri="http://schemas.openxmlformats.org/drawingml/2006/table">
-            <a:tbl>
-              <a:tblPr firstRow="1" bandRow="1">
-                <a:tableStyleId>{5940675A-B579-460E-94D1-54222C63F5DA}</a:tableStyleId>
-              </a:tblPr>
-              <a:tblGrid>
-                <a:gridCol w="2198166">
-                  <a:extLst>
-                    <a:ext uri="{9D8B030D-6E8A-4147-A177-3AD203B41FA5}">
-                      <a16:colId xmlns:a16="http://schemas.microsoft.com/office/drawing/2014/main" val="1929636500"/>
-                    </a:ext>
-                  </a:extLst>
-                </a:gridCol>
-                <a:gridCol w="2198166">
-                  <a:extLst>
-                    <a:ext uri="{9D8B030D-6E8A-4147-A177-3AD203B41FA5}">
-                      <a16:colId xmlns:a16="http://schemas.microsoft.com/office/drawing/2014/main" val="395898648"/>
-                    </a:ext>
-                  </a:extLst>
-                </a:gridCol>
-              </a:tblGrid>
-              <a:tr h="611391">
-                <a:tc>
-                  <a:txBody>
-                    <a:bodyPr/>
-                    <a:lstStyle/>
-                    <a:p>
-                      <a:pPr algn="ctr"/>
-                      <a:endParaRPr lang="en-US" sz="1500" dirty="0">
-                        <a:solidFill>
-                          <a:schemeClr val="bg1"/>
-                        </a:solidFill>
-                      </a:endParaRPr>
-                    </a:p>
-                  </a:txBody>
-                  <a:tcPr marL="75428" marR="75428" marT="37714" marB="37714" anchor="ctr">
-                    <a:solidFill>
-                      <a:schemeClr val="tx1"/>
-                    </a:solidFill>
-                  </a:tcPr>
-                </a:tc>
-                <a:tc>
-                  <a:txBody>
-                    <a:bodyPr/>
-                    <a:lstStyle/>
-                    <a:p>
-                      <a:pPr algn="ctr"/>
-                      <a:r>
-                        <a:rPr lang="de-AT" sz="1500" dirty="0" err="1">
-                          <a:solidFill>
-                            <a:schemeClr val="bg1"/>
-                          </a:solidFill>
-                        </a:rPr>
-                        <a:t>grant_type</a:t>
-                      </a:r>
-                      <a:endParaRPr lang="en-US" sz="1500" dirty="0">
-                        <a:solidFill>
-                          <a:schemeClr val="bg1"/>
-                        </a:solidFill>
-                      </a:endParaRPr>
-                    </a:p>
-                  </a:txBody>
-                  <a:tcPr marL="75428" marR="75428" marT="37714" marB="37714" anchor="ctr">
-                    <a:solidFill>
-                      <a:schemeClr val="tx1"/>
-                    </a:solidFill>
-                  </a:tcPr>
-                </a:tc>
-                <a:extLst>
-                  <a:ext uri="{0D108BD9-81ED-4DB2-BD59-A6C34878D82A}">
-                    <a16:rowId xmlns:a16="http://schemas.microsoft.com/office/drawing/2014/main" val="1928875511"/>
-                  </a:ext>
-                </a:extLst>
-              </a:tr>
-              <a:tr h="751996">
-                <a:tc>
-                  <a:txBody>
-                    <a:bodyPr/>
-                    <a:lstStyle/>
-                    <a:p>
-                      <a:pPr algn="ctr"/>
-                      <a:r>
-                        <a:rPr lang="de-AT" sz="1500" i="0" dirty="0"/>
-                        <a:t>Client </a:t>
-                      </a:r>
-                      <a:r>
-                        <a:rPr lang="de-AT" sz="1500" i="0" dirty="0" err="1"/>
-                        <a:t>Credential</a:t>
-                      </a:r>
-                      <a:r>
-                        <a:rPr lang="de-AT" sz="1500" i="0" dirty="0"/>
-                        <a:t> Grant</a:t>
-                      </a:r>
-                      <a:endParaRPr lang="en-US" sz="1500" i="0" dirty="0"/>
-                    </a:p>
-                  </a:txBody>
-                  <a:tcPr marL="75428" marR="75428" marT="37714" marB="37714" anchor="ctr">
-                    <a:solidFill>
-                      <a:schemeClr val="bg1">
-                        <a:lumMod val="85000"/>
-                      </a:schemeClr>
-                    </a:solidFill>
-                  </a:tcPr>
-                </a:tc>
-                <a:tc>
-                  <a:txBody>
-                    <a:bodyPr/>
-                    <a:lstStyle/>
-                    <a:p>
-                      <a:pPr algn="l"/>
-                      <a:r>
-                        <a:rPr lang="de-AT" sz="1500" dirty="0" err="1">
-                          <a:latin typeface="Consolas" panose="020B0609020204030204" pitchFamily="49" charset="0"/>
-                        </a:rPr>
-                        <a:t>client_credential</a:t>
-                      </a:r>
-                      <a:endParaRPr lang="en-US" sz="1500" dirty="0">
-                        <a:latin typeface="Consolas" panose="020B0609020204030204" pitchFamily="49" charset="0"/>
-                      </a:endParaRPr>
-                    </a:p>
-                  </a:txBody>
-                  <a:tcPr marL="75428" marR="75428" marT="37714" marB="37714" anchor="ctr"/>
-                </a:tc>
-                <a:extLst>
-                  <a:ext uri="{0D108BD9-81ED-4DB2-BD59-A6C34878D82A}">
-                    <a16:rowId xmlns:a16="http://schemas.microsoft.com/office/drawing/2014/main" val="1320869910"/>
-                  </a:ext>
-                </a:extLst>
-              </a:tr>
-              <a:tr h="751996">
-                <a:tc>
-                  <a:txBody>
-                    <a:bodyPr/>
-                    <a:lstStyle/>
-                    <a:p>
-                      <a:pPr marL="0" marR="0" lvl="0" indent="0" algn="ctr" defTabSz="914400" rtl="0" eaLnBrk="1" fontAlgn="auto" latinLnBrk="0" hangingPunct="1">
-                        <a:lnSpc>
-                          <a:spcPct val="100000"/>
-                        </a:lnSpc>
-                        <a:spcBef>
-                          <a:spcPts val="0"/>
-                        </a:spcBef>
-                        <a:spcAft>
-                          <a:spcPts val="0"/>
-                        </a:spcAft>
-                        <a:buClrTx/>
-                        <a:buSzTx/>
-                        <a:buFontTx/>
-                        <a:buNone/>
-                        <a:tabLst/>
-                        <a:defRPr/>
-                      </a:pPr>
-                      <a:r>
-                        <a:rPr lang="de-AT" sz="1500" i="0" dirty="0" err="1"/>
-                        <a:t>Resource</a:t>
-                      </a:r>
-                      <a:r>
-                        <a:rPr lang="de-AT" sz="1500" i="0" dirty="0"/>
-                        <a:t> </a:t>
-                      </a:r>
-                      <a:r>
-                        <a:rPr lang="de-AT" sz="1500" i="0" dirty="0" err="1"/>
-                        <a:t>Owner</a:t>
-                      </a:r>
-                      <a:r>
-                        <a:rPr lang="de-AT" sz="1500" i="0" dirty="0"/>
-                        <a:t> Password Grant</a:t>
-                      </a:r>
-                      <a:endParaRPr lang="en-US" sz="1500" i="0" dirty="0"/>
-                    </a:p>
-                  </a:txBody>
-                  <a:tcPr marL="75428" marR="75428" marT="37714" marB="37714" anchor="ctr">
-                    <a:solidFill>
-                      <a:schemeClr val="bg1">
-                        <a:lumMod val="85000"/>
-                      </a:schemeClr>
-                    </a:solidFill>
-                  </a:tcPr>
-                </a:tc>
-                <a:tc>
-                  <a:txBody>
-                    <a:bodyPr/>
-                    <a:lstStyle/>
-                    <a:p>
-                      <a:pPr algn="l"/>
-                      <a:r>
-                        <a:rPr lang="de-AT" sz="1500" dirty="0" err="1">
-                          <a:latin typeface="Consolas" panose="020B0609020204030204" pitchFamily="49" charset="0"/>
-                        </a:rPr>
-                        <a:t>password</a:t>
-                      </a:r>
-                      <a:endParaRPr lang="en-US" sz="1500" dirty="0">
-                        <a:latin typeface="Consolas" panose="020B0609020204030204" pitchFamily="49" charset="0"/>
-                      </a:endParaRPr>
-                    </a:p>
-                  </a:txBody>
-                  <a:tcPr marL="75428" marR="75428" marT="37714" marB="37714" anchor="ctr"/>
-                </a:tc>
-                <a:extLst>
-                  <a:ext uri="{0D108BD9-81ED-4DB2-BD59-A6C34878D82A}">
-                    <a16:rowId xmlns:a16="http://schemas.microsoft.com/office/drawing/2014/main" val="685321953"/>
-                  </a:ext>
-                </a:extLst>
-              </a:tr>
-              <a:tr h="611391">
-                <a:tc>
-                  <a:txBody>
-                    <a:bodyPr/>
-                    <a:lstStyle/>
-                    <a:p>
-                      <a:pPr marL="0" marR="0" lvl="0" indent="0" algn="ctr" defTabSz="914400" rtl="0" eaLnBrk="1" fontAlgn="auto" latinLnBrk="0" hangingPunct="1">
-                        <a:lnSpc>
-                          <a:spcPct val="100000"/>
-                        </a:lnSpc>
-                        <a:spcBef>
-                          <a:spcPts val="0"/>
-                        </a:spcBef>
-                        <a:spcAft>
-                          <a:spcPts val="0"/>
-                        </a:spcAft>
-                        <a:buClrTx/>
-                        <a:buSzTx/>
-                        <a:buFontTx/>
-                        <a:buNone/>
-                        <a:tabLst/>
-                        <a:defRPr/>
-                      </a:pPr>
-                      <a:r>
-                        <a:rPr lang="de-AT" sz="1500" i="0" dirty="0" err="1"/>
-                        <a:t>Authorization</a:t>
-                      </a:r>
-                      <a:r>
-                        <a:rPr lang="de-AT" sz="1500" i="0" dirty="0"/>
-                        <a:t> Code Flow</a:t>
-                      </a:r>
-                      <a:endParaRPr lang="en-US" sz="1500" i="0" dirty="0"/>
-                    </a:p>
-                  </a:txBody>
-                  <a:tcPr marL="75428" marR="75428" marT="37714" marB="37714" anchor="ctr">
-                    <a:solidFill>
-                      <a:schemeClr val="bg1">
-                        <a:lumMod val="85000"/>
-                      </a:schemeClr>
-                    </a:solidFill>
-                  </a:tcPr>
-                </a:tc>
-                <a:tc>
-                  <a:txBody>
-                    <a:bodyPr/>
-                    <a:lstStyle/>
-                    <a:p>
-                      <a:pPr algn="l"/>
-                      <a:r>
-                        <a:rPr lang="de-AT" sz="1500" dirty="0">
-                          <a:latin typeface="Consolas" panose="020B0609020204030204" pitchFamily="49" charset="0"/>
-                        </a:rPr>
-                        <a:t>code</a:t>
-                      </a:r>
-                    </a:p>
-                  </a:txBody>
-                  <a:tcPr marL="75428" marR="75428" marT="37714" marB="37714" anchor="ctr"/>
-                </a:tc>
-                <a:extLst>
-                  <a:ext uri="{0D108BD9-81ED-4DB2-BD59-A6C34878D82A}">
-                    <a16:rowId xmlns:a16="http://schemas.microsoft.com/office/drawing/2014/main" val="356802342"/>
-                  </a:ext>
-                </a:extLst>
-              </a:tr>
-              <a:tr h="611391">
-                <a:tc>
-                  <a:txBody>
-                    <a:bodyPr/>
-                    <a:lstStyle/>
-                    <a:p>
-                      <a:pPr marL="0" marR="0" lvl="0" indent="0" algn="ctr" defTabSz="914400" rtl="0" eaLnBrk="1" fontAlgn="auto" latinLnBrk="0" hangingPunct="1">
-                        <a:lnSpc>
-                          <a:spcPct val="100000"/>
-                        </a:lnSpc>
-                        <a:spcBef>
-                          <a:spcPts val="0"/>
-                        </a:spcBef>
-                        <a:spcAft>
-                          <a:spcPts val="0"/>
-                        </a:spcAft>
-                        <a:buClrTx/>
-                        <a:buSzTx/>
-                        <a:buFontTx/>
-                        <a:buNone/>
-                        <a:tabLst/>
-                        <a:defRPr/>
-                      </a:pPr>
-                      <a:r>
-                        <a:rPr lang="de-AT" sz="1500" i="0" dirty="0" err="1"/>
-                        <a:t>Implicit</a:t>
-                      </a:r>
-                      <a:r>
-                        <a:rPr lang="de-AT" sz="1500" i="0" dirty="0"/>
-                        <a:t> </a:t>
-                      </a:r>
-                      <a:r>
-                        <a:rPr lang="de-AT" sz="1500" i="0"/>
-                        <a:t>Code Flow</a:t>
-                      </a:r>
-                      <a:endParaRPr lang="en-US" sz="1500" i="0" dirty="0"/>
-                    </a:p>
-                  </a:txBody>
-                  <a:tcPr marL="75428" marR="75428" marT="37714" marB="37714" anchor="ctr">
-                    <a:solidFill>
-                      <a:schemeClr val="bg1">
-                        <a:lumMod val="85000"/>
-                      </a:schemeClr>
-                    </a:solidFill>
-                  </a:tcPr>
-                </a:tc>
-                <a:tc>
-                  <a:txBody>
-                    <a:bodyPr/>
-                    <a:lstStyle/>
-                    <a:p>
-                      <a:pPr algn="l"/>
-                      <a:r>
-                        <a:rPr lang="de-AT" sz="1500" dirty="0" err="1">
-                          <a:latin typeface="Consolas" panose="020B0609020204030204" pitchFamily="49" charset="0"/>
-                        </a:rPr>
-                        <a:t>id_token</a:t>
-                      </a:r>
-                      <a:endParaRPr lang="de-AT" sz="1500" dirty="0">
-                        <a:latin typeface="Consolas" panose="020B0609020204030204" pitchFamily="49" charset="0"/>
-                      </a:endParaRPr>
-                    </a:p>
-                    <a:p>
-                      <a:pPr algn="l"/>
-                      <a:r>
-                        <a:rPr lang="de-AT" sz="1500" dirty="0" err="1">
-                          <a:latin typeface="Consolas" panose="020B0609020204030204" pitchFamily="49" charset="0"/>
-                        </a:rPr>
-                        <a:t>id_token</a:t>
-                      </a:r>
-                      <a:r>
-                        <a:rPr lang="de-AT" sz="1500" dirty="0">
-                          <a:latin typeface="Consolas" panose="020B0609020204030204" pitchFamily="49" charset="0"/>
-                        </a:rPr>
-                        <a:t> </a:t>
-                      </a:r>
-                      <a:r>
-                        <a:rPr lang="de-AT" sz="1500" dirty="0" err="1">
-                          <a:latin typeface="Consolas" panose="020B0609020204030204" pitchFamily="49" charset="0"/>
-                        </a:rPr>
-                        <a:t>token</a:t>
-                      </a:r>
-                      <a:endParaRPr lang="de-AT" sz="1500" dirty="0">
-                        <a:latin typeface="Consolas" panose="020B0609020204030204" pitchFamily="49" charset="0"/>
-                      </a:endParaRPr>
-                    </a:p>
-                  </a:txBody>
-                  <a:tcPr marL="75428" marR="75428" marT="37714" marB="37714" anchor="ctr"/>
-                </a:tc>
-                <a:extLst>
-                  <a:ext uri="{0D108BD9-81ED-4DB2-BD59-A6C34878D82A}">
-                    <a16:rowId xmlns:a16="http://schemas.microsoft.com/office/drawing/2014/main" val="1447987830"/>
-                  </a:ext>
-                </a:extLst>
-              </a:tr>
-              <a:tr h="754276">
-                <a:tc>
-                  <a:txBody>
-                    <a:bodyPr/>
-                    <a:lstStyle/>
-                    <a:p>
-                      <a:pPr marL="0" marR="0" lvl="0" indent="0" algn="ctr" defTabSz="914400" rtl="0" eaLnBrk="1" fontAlgn="auto" latinLnBrk="0" hangingPunct="1">
-                        <a:lnSpc>
-                          <a:spcPct val="100000"/>
-                        </a:lnSpc>
-                        <a:spcBef>
-                          <a:spcPts val="0"/>
-                        </a:spcBef>
-                        <a:spcAft>
-                          <a:spcPts val="0"/>
-                        </a:spcAft>
-                        <a:buClrTx/>
-                        <a:buSzTx/>
-                        <a:buFontTx/>
-                        <a:buNone/>
-                        <a:tabLst/>
-                        <a:defRPr/>
-                      </a:pPr>
-                      <a:r>
-                        <a:rPr lang="de-AT" sz="1500" i="0" dirty="0"/>
-                        <a:t>Hybrid Flow</a:t>
-                      </a:r>
-                      <a:endParaRPr lang="en-US" sz="1500" i="0" dirty="0"/>
-                    </a:p>
-                  </a:txBody>
-                  <a:tcPr marL="75428" marR="75428" marT="37714" marB="37714" anchor="ctr">
-                    <a:solidFill>
-                      <a:schemeClr val="bg1">
-                        <a:lumMod val="85000"/>
-                      </a:schemeClr>
-                    </a:solidFill>
-                  </a:tcPr>
-                </a:tc>
-                <a:tc>
-                  <a:txBody>
-                    <a:bodyPr/>
-                    <a:lstStyle/>
-                    <a:p>
-                      <a:pPr algn="l"/>
-                      <a:r>
-                        <a:rPr lang="de-AT" sz="1500" dirty="0">
-                          <a:latin typeface="Consolas" panose="020B0609020204030204" pitchFamily="49" charset="0"/>
-                        </a:rPr>
-                        <a:t>code </a:t>
-                      </a:r>
-                      <a:r>
-                        <a:rPr lang="de-AT" sz="1500" dirty="0" err="1">
-                          <a:latin typeface="Consolas" panose="020B0609020204030204" pitchFamily="49" charset="0"/>
-                        </a:rPr>
-                        <a:t>id_token</a:t>
-                      </a:r>
-                      <a:endParaRPr lang="de-AT" sz="1500" dirty="0">
-                        <a:latin typeface="Consolas" panose="020B0609020204030204" pitchFamily="49" charset="0"/>
-                      </a:endParaRPr>
-                    </a:p>
-                    <a:p>
-                      <a:pPr algn="l"/>
-                      <a:r>
-                        <a:rPr lang="de-AT" sz="1500" dirty="0">
-                          <a:latin typeface="Consolas" panose="020B0609020204030204" pitchFamily="49" charset="0"/>
-                        </a:rPr>
-                        <a:t>code </a:t>
-                      </a:r>
-                      <a:r>
-                        <a:rPr lang="de-AT" sz="1500" dirty="0" err="1">
-                          <a:latin typeface="Consolas" panose="020B0609020204030204" pitchFamily="49" charset="0"/>
-                        </a:rPr>
-                        <a:t>token</a:t>
-                      </a:r>
-                      <a:endParaRPr lang="de-AT" sz="1500" dirty="0">
-                        <a:latin typeface="Consolas" panose="020B0609020204030204" pitchFamily="49" charset="0"/>
-                      </a:endParaRPr>
-                    </a:p>
-                    <a:p>
-                      <a:pPr algn="l"/>
-                      <a:r>
-                        <a:rPr lang="de-AT" sz="1500" dirty="0" err="1">
-                          <a:latin typeface="Consolas" panose="020B0609020204030204" pitchFamily="49" charset="0"/>
-                        </a:rPr>
-                        <a:t>code</a:t>
-                      </a:r>
-                      <a:r>
-                        <a:rPr lang="de-AT" sz="1500" dirty="0">
-                          <a:latin typeface="Consolas" panose="020B0609020204030204" pitchFamily="49" charset="0"/>
-                        </a:rPr>
-                        <a:t> </a:t>
-                      </a:r>
-                      <a:r>
-                        <a:rPr lang="de-AT" sz="1500" dirty="0" err="1">
-                          <a:latin typeface="Consolas" panose="020B0609020204030204" pitchFamily="49" charset="0"/>
-                        </a:rPr>
-                        <a:t>id_token</a:t>
-                      </a:r>
-                      <a:r>
-                        <a:rPr lang="de-AT" sz="1500" dirty="0">
-                          <a:latin typeface="Consolas" panose="020B0609020204030204" pitchFamily="49" charset="0"/>
-                        </a:rPr>
-                        <a:t> </a:t>
-                      </a:r>
-                      <a:r>
-                        <a:rPr lang="de-AT" sz="1500" dirty="0" err="1">
-                          <a:latin typeface="Consolas" panose="020B0609020204030204" pitchFamily="49" charset="0"/>
-                        </a:rPr>
-                        <a:t>token</a:t>
-                      </a:r>
-                      <a:endParaRPr lang="de-AT" sz="1500" dirty="0">
-                        <a:latin typeface="Consolas" panose="020B0609020204030204" pitchFamily="49" charset="0"/>
-                      </a:endParaRPr>
-                    </a:p>
-                  </a:txBody>
-                  <a:tcPr marL="75428" marR="75428" marT="37714" marB="37714" anchor="ctr"/>
-                </a:tc>
-                <a:extLst>
-                  <a:ext uri="{0D108BD9-81ED-4DB2-BD59-A6C34878D82A}">
-                    <a16:rowId xmlns:a16="http://schemas.microsoft.com/office/drawing/2014/main" val="757970485"/>
-                  </a:ext>
-                </a:extLst>
-              </a:tr>
-              <a:tr h="611391">
-                <a:tc>
-                  <a:txBody>
-                    <a:bodyPr/>
-                    <a:lstStyle/>
-                    <a:p>
-                      <a:pPr marL="0" marR="0" lvl="0" indent="0" algn="ctr" defTabSz="914400" rtl="0" eaLnBrk="1" fontAlgn="auto" latinLnBrk="0" hangingPunct="1">
-                        <a:lnSpc>
-                          <a:spcPct val="100000"/>
-                        </a:lnSpc>
-                        <a:spcBef>
-                          <a:spcPts val="0"/>
-                        </a:spcBef>
-                        <a:spcAft>
-                          <a:spcPts val="0"/>
-                        </a:spcAft>
-                        <a:buClrTx/>
-                        <a:buSzTx/>
-                        <a:buFontTx/>
-                        <a:buNone/>
-                        <a:tabLst/>
-                        <a:defRPr/>
-                      </a:pPr>
-                      <a:r>
-                        <a:rPr lang="de-AT" sz="1500" i="0" dirty="0"/>
-                        <a:t>Device </a:t>
-                      </a:r>
-                      <a:r>
-                        <a:rPr lang="de-AT" sz="1500" i="0" dirty="0" err="1"/>
-                        <a:t>Authorization</a:t>
-                      </a:r>
-                      <a:r>
-                        <a:rPr lang="de-AT" sz="1500" i="0" dirty="0"/>
-                        <a:t> Grant</a:t>
-                      </a:r>
-                      <a:endParaRPr lang="en-US" sz="1500" i="0" dirty="0"/>
-                    </a:p>
-                  </a:txBody>
-                  <a:tcPr marL="75428" marR="75428" marT="37714" marB="37714" anchor="ctr">
-                    <a:solidFill>
-                      <a:schemeClr val="bg1">
-                        <a:lumMod val="85000"/>
-                      </a:schemeClr>
-                    </a:solidFill>
-                  </a:tcPr>
-                </a:tc>
-                <a:tc>
-                  <a:txBody>
-                    <a:bodyPr/>
-                    <a:lstStyle/>
-                    <a:p>
-                      <a:pPr algn="l"/>
-                      <a:r>
-                        <a:rPr lang="en-US" sz="1500" b="0" i="0" kern="1200" dirty="0" err="1">
-                          <a:solidFill>
-                            <a:schemeClr val="tx1"/>
-                          </a:solidFill>
-                          <a:effectLst/>
-                          <a:latin typeface="Consolas" panose="020B0609020204030204" pitchFamily="49" charset="0"/>
-                          <a:ea typeface="+mn-ea"/>
-                          <a:cs typeface="+mn-cs"/>
-                        </a:rPr>
-                        <a:t>device_code</a:t>
-                      </a:r>
-                      <a:endParaRPr lang="de-AT" sz="1500" b="0" dirty="0">
-                        <a:latin typeface="Consolas" panose="020B0609020204030204" pitchFamily="49" charset="0"/>
-                      </a:endParaRPr>
-                    </a:p>
-                  </a:txBody>
-                  <a:tcPr marL="75428" marR="75428" marT="37714" marB="37714" anchor="ctr"/>
-                </a:tc>
-                <a:extLst>
-                  <a:ext uri="{0D108BD9-81ED-4DB2-BD59-A6C34878D82A}">
-                    <a16:rowId xmlns:a16="http://schemas.microsoft.com/office/drawing/2014/main" val="3088025262"/>
-                  </a:ext>
-                </a:extLst>
-              </a:tr>
-            </a:tbl>
-          </a:graphicData>
-        </a:graphic>
-      </p:graphicFrame>
-    </p:spTree>
-    <p:extLst>
-      <p:ext uri="{BB962C8B-B14F-4D97-AF65-F5344CB8AC3E}">
-        <p14:creationId xmlns:p14="http://schemas.microsoft.com/office/powerpoint/2010/main" val="1154701325"/>
       </p:ext>
     </p:extLst>
   </p:cSld>
@@ -45507,6 +45043,1792 @@
           <p:cNvPr id="2" name="Title 1">
             <a:extLst>
               <a:ext uri="{FF2B5EF4-FFF2-40B4-BE49-F238E27FC236}">
+                <a16:creationId xmlns:a16="http://schemas.microsoft.com/office/drawing/2014/main" id="{348397C1-A147-42F6-8AF5-33AF5868C7CC}"/>
+              </a:ext>
+            </a:extLst>
+          </p:cNvPr>
+          <p:cNvSpPr>
+            <a:spLocks noGrp="1"/>
+          </p:cNvSpPr>
+          <p:nvPr>
+            <p:ph type="title"/>
+          </p:nvPr>
+        </p:nvSpPr>
+        <p:spPr/>
+        <p:txBody>
+          <a:bodyPr/>
+          <a:lstStyle/>
+          <a:p>
+            <a:r>
+              <a:rPr lang="de-AT" dirty="0"/>
+              <a:t>Zusammenfassung Grant/Flow Features</a:t>
+            </a:r>
+            <a:endParaRPr lang="en-US" dirty="0"/>
+          </a:p>
+        </p:txBody>
+      </p:sp>
+      <p:graphicFrame>
+        <p:nvGraphicFramePr>
+          <p:cNvPr id="3" name="Table 2">
+            <a:extLst>
+              <a:ext uri="{FF2B5EF4-FFF2-40B4-BE49-F238E27FC236}">
+                <a16:creationId xmlns:a16="http://schemas.microsoft.com/office/drawing/2014/main" id="{92A1B128-AAB2-47F0-9CD1-9CCC30105557}"/>
+              </a:ext>
+            </a:extLst>
+          </p:cNvPr>
+          <p:cNvGraphicFramePr>
+            <a:graphicFrameLocks noGrp="1"/>
+          </p:cNvGraphicFramePr>
+          <p:nvPr>
+            <p:extLst>
+              <p:ext uri="{D42A27DB-BD31-4B8C-83A1-F6EECF244321}">
+                <p14:modId xmlns:p14="http://schemas.microsoft.com/office/powerpoint/2010/main" val="2392915148"/>
+              </p:ext>
+            </p:extLst>
+          </p:nvPr>
+        </p:nvGraphicFramePr>
+        <p:xfrm>
+          <a:off x="838200" y="1350869"/>
+          <a:ext cx="10440003" cy="5245549"/>
+        </p:xfrm>
+        <a:graphic>
+          <a:graphicData uri="http://schemas.openxmlformats.org/drawingml/2006/table">
+            <a:tbl>
+              <a:tblPr firstRow="1" bandRow="1">
+                <a:tableStyleId>{5940675A-B579-460E-94D1-54222C63F5DA}</a:tableStyleId>
+              </a:tblPr>
+              <a:tblGrid>
+                <a:gridCol w="1664855">
+                  <a:extLst>
+                    <a:ext uri="{9D8B030D-6E8A-4147-A177-3AD203B41FA5}">
+                      <a16:colId xmlns:a16="http://schemas.microsoft.com/office/drawing/2014/main" val="1929636500"/>
+                    </a:ext>
+                  </a:extLst>
+                </a:gridCol>
+                <a:gridCol w="1318003">
+                  <a:extLst>
+                    <a:ext uri="{9D8B030D-6E8A-4147-A177-3AD203B41FA5}">
+                      <a16:colId xmlns:a16="http://schemas.microsoft.com/office/drawing/2014/main" val="395898648"/>
+                    </a:ext>
+                  </a:extLst>
+                </a:gridCol>
+                <a:gridCol w="1491429">
+                  <a:extLst>
+                    <a:ext uri="{9D8B030D-6E8A-4147-A177-3AD203B41FA5}">
+                      <a16:colId xmlns:a16="http://schemas.microsoft.com/office/drawing/2014/main" val="1690800767"/>
+                    </a:ext>
+                  </a:extLst>
+                </a:gridCol>
+                <a:gridCol w="1491429">
+                  <a:extLst>
+                    <a:ext uri="{9D8B030D-6E8A-4147-A177-3AD203B41FA5}">
+                      <a16:colId xmlns:a16="http://schemas.microsoft.com/office/drawing/2014/main" val="3240070001"/>
+                    </a:ext>
+                  </a:extLst>
+                </a:gridCol>
+                <a:gridCol w="1491429">
+                  <a:extLst>
+                    <a:ext uri="{9D8B030D-6E8A-4147-A177-3AD203B41FA5}">
+                      <a16:colId xmlns:a16="http://schemas.microsoft.com/office/drawing/2014/main" val="116783287"/>
+                    </a:ext>
+                  </a:extLst>
+                </a:gridCol>
+                <a:gridCol w="1491429">
+                  <a:extLst>
+                    <a:ext uri="{9D8B030D-6E8A-4147-A177-3AD203B41FA5}">
+                      <a16:colId xmlns:a16="http://schemas.microsoft.com/office/drawing/2014/main" val="492657174"/>
+                    </a:ext>
+                  </a:extLst>
+                </a:gridCol>
+                <a:gridCol w="1491429">
+                  <a:extLst>
+                    <a:ext uri="{9D8B030D-6E8A-4147-A177-3AD203B41FA5}">
+                      <a16:colId xmlns:a16="http://schemas.microsoft.com/office/drawing/2014/main" val="847277139"/>
+                    </a:ext>
+                  </a:extLst>
+                </a:gridCol>
+              </a:tblGrid>
+              <a:tr h="652650">
+                <a:tc>
+                  <a:txBody>
+                    <a:bodyPr/>
+                    <a:lstStyle/>
+                    <a:p>
+                      <a:pPr algn="ctr"/>
+                      <a:endParaRPr lang="en-US" dirty="0">
+                        <a:solidFill>
+                          <a:schemeClr val="bg1"/>
+                        </a:solidFill>
+                      </a:endParaRPr>
+                    </a:p>
+                  </a:txBody>
+                  <a:tcPr anchor="ctr">
+                    <a:solidFill>
+                      <a:schemeClr val="tx1"/>
+                    </a:solidFill>
+                  </a:tcPr>
+                </a:tc>
+                <a:tc>
+                  <a:txBody>
+                    <a:bodyPr/>
+                    <a:lstStyle/>
+                    <a:p>
+                      <a:pPr algn="ctr"/>
+                      <a:r>
+                        <a:rPr lang="de-AT" dirty="0">
+                          <a:solidFill>
+                            <a:schemeClr val="bg1"/>
+                          </a:solidFill>
+                        </a:rPr>
+                        <a:t>Client </a:t>
+                      </a:r>
+                      <a:r>
+                        <a:rPr lang="de-AT" dirty="0" err="1">
+                          <a:solidFill>
+                            <a:schemeClr val="bg1"/>
+                          </a:solidFill>
+                        </a:rPr>
+                        <a:t>Credential</a:t>
+                      </a:r>
+                      <a:r>
+                        <a:rPr lang="de-AT" dirty="0">
+                          <a:solidFill>
+                            <a:schemeClr val="bg1"/>
+                          </a:solidFill>
+                        </a:rPr>
+                        <a:t> Grant</a:t>
+                      </a:r>
+                      <a:endParaRPr lang="en-US" dirty="0">
+                        <a:solidFill>
+                          <a:schemeClr val="bg1"/>
+                        </a:solidFill>
+                      </a:endParaRPr>
+                    </a:p>
+                  </a:txBody>
+                  <a:tcPr anchor="ctr">
+                    <a:solidFill>
+                      <a:schemeClr val="tx1"/>
+                    </a:solidFill>
+                  </a:tcPr>
+                </a:tc>
+                <a:tc>
+                  <a:txBody>
+                    <a:bodyPr/>
+                    <a:lstStyle/>
+                    <a:p>
+                      <a:pPr algn="ctr"/>
+                      <a:r>
+                        <a:rPr lang="de-AT" dirty="0" err="1">
+                          <a:solidFill>
+                            <a:schemeClr val="bg1"/>
+                          </a:solidFill>
+                        </a:rPr>
+                        <a:t>Resource</a:t>
+                      </a:r>
+                      <a:r>
+                        <a:rPr lang="de-AT" dirty="0">
+                          <a:solidFill>
+                            <a:schemeClr val="bg1"/>
+                          </a:solidFill>
+                        </a:rPr>
+                        <a:t> </a:t>
+                      </a:r>
+                      <a:r>
+                        <a:rPr lang="de-AT" dirty="0" err="1">
+                          <a:solidFill>
+                            <a:schemeClr val="bg1"/>
+                          </a:solidFill>
+                        </a:rPr>
+                        <a:t>Owner</a:t>
+                      </a:r>
+                      <a:r>
+                        <a:rPr lang="de-AT" dirty="0">
+                          <a:solidFill>
+                            <a:schemeClr val="bg1"/>
+                          </a:solidFill>
+                        </a:rPr>
+                        <a:t> </a:t>
+                      </a:r>
+                      <a:r>
+                        <a:rPr lang="de-AT" dirty="0" err="1">
+                          <a:solidFill>
+                            <a:schemeClr val="bg1"/>
+                          </a:solidFill>
+                        </a:rPr>
+                        <a:t>Pwd</a:t>
+                      </a:r>
+                      <a:r>
+                        <a:rPr lang="de-AT" dirty="0">
+                          <a:solidFill>
+                            <a:schemeClr val="bg1"/>
+                          </a:solidFill>
+                        </a:rPr>
+                        <a:t> Grant</a:t>
+                      </a:r>
+                      <a:endParaRPr lang="en-US" dirty="0">
+                        <a:solidFill>
+                          <a:schemeClr val="bg1"/>
+                        </a:solidFill>
+                      </a:endParaRPr>
+                    </a:p>
+                  </a:txBody>
+                  <a:tcPr anchor="ctr">
+                    <a:solidFill>
+                      <a:schemeClr val="tx1"/>
+                    </a:solidFill>
+                  </a:tcPr>
+                </a:tc>
+                <a:tc>
+                  <a:txBody>
+                    <a:bodyPr/>
+                    <a:lstStyle/>
+                    <a:p>
+                      <a:pPr algn="ctr"/>
+                      <a:r>
+                        <a:rPr lang="de-AT" dirty="0" err="1">
+                          <a:solidFill>
+                            <a:schemeClr val="bg1"/>
+                          </a:solidFill>
+                        </a:rPr>
+                        <a:t>Authorization</a:t>
+                      </a:r>
+                      <a:r>
+                        <a:rPr lang="de-AT" dirty="0">
+                          <a:solidFill>
+                            <a:schemeClr val="bg1"/>
+                          </a:solidFill>
+                        </a:rPr>
+                        <a:t> Code Flow</a:t>
+                      </a:r>
+                      <a:endParaRPr lang="en-US" dirty="0">
+                        <a:solidFill>
+                          <a:schemeClr val="bg1"/>
+                        </a:solidFill>
+                      </a:endParaRPr>
+                    </a:p>
+                  </a:txBody>
+                  <a:tcPr anchor="ctr">
+                    <a:solidFill>
+                      <a:schemeClr val="tx1"/>
+                    </a:solidFill>
+                  </a:tcPr>
+                </a:tc>
+                <a:tc>
+                  <a:txBody>
+                    <a:bodyPr/>
+                    <a:lstStyle/>
+                    <a:p>
+                      <a:pPr algn="ctr"/>
+                      <a:r>
+                        <a:rPr lang="de-AT" dirty="0" err="1">
+                          <a:solidFill>
+                            <a:schemeClr val="bg1"/>
+                          </a:solidFill>
+                        </a:rPr>
+                        <a:t>Implict</a:t>
+                      </a:r>
+                      <a:r>
+                        <a:rPr lang="de-AT" dirty="0">
+                          <a:solidFill>
+                            <a:schemeClr val="bg1"/>
+                          </a:solidFill>
+                        </a:rPr>
+                        <a:t> Flow</a:t>
+                      </a:r>
+                      <a:endParaRPr lang="en-US" dirty="0">
+                        <a:solidFill>
+                          <a:schemeClr val="bg1"/>
+                        </a:solidFill>
+                      </a:endParaRPr>
+                    </a:p>
+                  </a:txBody>
+                  <a:tcPr anchor="ctr">
+                    <a:solidFill>
+                      <a:schemeClr val="tx1"/>
+                    </a:solidFill>
+                  </a:tcPr>
+                </a:tc>
+                <a:tc>
+                  <a:txBody>
+                    <a:bodyPr/>
+                    <a:lstStyle/>
+                    <a:p>
+                      <a:pPr algn="ctr"/>
+                      <a:r>
+                        <a:rPr lang="de-AT" dirty="0">
+                          <a:solidFill>
+                            <a:schemeClr val="bg1"/>
+                          </a:solidFill>
+                        </a:rPr>
+                        <a:t>Hybrid Flow</a:t>
+                      </a:r>
+                      <a:endParaRPr lang="en-US" dirty="0">
+                        <a:solidFill>
+                          <a:schemeClr val="bg1"/>
+                        </a:solidFill>
+                      </a:endParaRPr>
+                    </a:p>
+                  </a:txBody>
+                  <a:tcPr anchor="ctr">
+                    <a:solidFill>
+                      <a:schemeClr val="tx1"/>
+                    </a:solidFill>
+                  </a:tcPr>
+                </a:tc>
+                <a:tc>
+                  <a:txBody>
+                    <a:bodyPr/>
+                    <a:lstStyle/>
+                    <a:p>
+                      <a:pPr algn="ctr"/>
+                      <a:r>
+                        <a:rPr lang="de-AT" dirty="0">
+                          <a:solidFill>
+                            <a:schemeClr val="bg1"/>
+                          </a:solidFill>
+                        </a:rPr>
+                        <a:t>Device Auth Grant</a:t>
+                      </a:r>
+                      <a:endParaRPr lang="en-US" dirty="0">
+                        <a:solidFill>
+                          <a:schemeClr val="bg1"/>
+                        </a:solidFill>
+                      </a:endParaRPr>
+                    </a:p>
+                  </a:txBody>
+                  <a:tcPr anchor="ctr">
+                    <a:solidFill>
+                      <a:schemeClr val="tx1"/>
+                    </a:solidFill>
+                  </a:tcPr>
+                </a:tc>
+                <a:extLst>
+                  <a:ext uri="{0D108BD9-81ED-4DB2-BD59-A6C34878D82A}">
+                    <a16:rowId xmlns:a16="http://schemas.microsoft.com/office/drawing/2014/main" val="1928875511"/>
+                  </a:ext>
+                </a:extLst>
+              </a:tr>
+              <a:tr h="825139">
+                <a:tc>
+                  <a:txBody>
+                    <a:bodyPr/>
+                    <a:lstStyle/>
+                    <a:p>
+                      <a:pPr algn="ctr"/>
+                      <a:r>
+                        <a:rPr lang="de-AT" dirty="0"/>
+                        <a:t>Alle Tokens von </a:t>
+                      </a:r>
+                      <a:r>
+                        <a:rPr lang="de-AT" i="1" dirty="0" err="1"/>
+                        <a:t>Authorization</a:t>
+                      </a:r>
+                      <a:r>
+                        <a:rPr lang="de-AT" i="1" dirty="0"/>
+                        <a:t> Endpunkt</a:t>
+                      </a:r>
+                      <a:endParaRPr lang="en-US" i="1" dirty="0"/>
+                    </a:p>
+                  </a:txBody>
+                  <a:tcPr anchor="ctr">
+                    <a:solidFill>
+                      <a:schemeClr val="bg1">
+                        <a:lumMod val="85000"/>
+                      </a:schemeClr>
+                    </a:solidFill>
+                  </a:tcPr>
+                </a:tc>
+                <a:tc>
+                  <a:txBody>
+                    <a:bodyPr/>
+                    <a:lstStyle/>
+                    <a:p>
+                      <a:pPr algn="ctr"/>
+                      <a:endParaRPr lang="en-US" dirty="0"/>
+                    </a:p>
+                  </a:txBody>
+                  <a:tcPr anchor="ctr"/>
+                </a:tc>
+                <a:tc>
+                  <a:txBody>
+                    <a:bodyPr/>
+                    <a:lstStyle/>
+                    <a:p>
+                      <a:pPr algn="ctr"/>
+                      <a:endParaRPr lang="en-US" dirty="0"/>
+                    </a:p>
+                  </a:txBody>
+                  <a:tcPr anchor="ctr"/>
+                </a:tc>
+                <a:tc>
+                  <a:txBody>
+                    <a:bodyPr/>
+                    <a:lstStyle/>
+                    <a:p>
+                      <a:pPr algn="ctr"/>
+                      <a:endParaRPr lang="en-US" dirty="0"/>
+                    </a:p>
+                  </a:txBody>
+                  <a:tcPr anchor="ctr"/>
+                </a:tc>
+                <a:tc>
+                  <a:txBody>
+                    <a:bodyPr/>
+                    <a:lstStyle/>
+                    <a:p>
+                      <a:pPr algn="ctr"/>
+                      <a:r>
+                        <a:rPr lang="de-AT" dirty="0"/>
+                        <a:t>X</a:t>
+                      </a:r>
+                      <a:endParaRPr lang="en-US" dirty="0"/>
+                    </a:p>
+                  </a:txBody>
+                  <a:tcPr anchor="ctr"/>
+                </a:tc>
+                <a:tc>
+                  <a:txBody>
+                    <a:bodyPr/>
+                    <a:lstStyle/>
+                    <a:p>
+                      <a:pPr algn="ctr"/>
+                      <a:endParaRPr lang="en-US" dirty="0"/>
+                    </a:p>
+                  </a:txBody>
+                  <a:tcPr anchor="ctr"/>
+                </a:tc>
+                <a:tc>
+                  <a:txBody>
+                    <a:bodyPr/>
+                    <a:lstStyle/>
+                    <a:p>
+                      <a:pPr algn="ctr"/>
+                      <a:endParaRPr lang="en-US" dirty="0"/>
+                    </a:p>
+                  </a:txBody>
+                  <a:tcPr anchor="ctr"/>
+                </a:tc>
+                <a:extLst>
+                  <a:ext uri="{0D108BD9-81ED-4DB2-BD59-A6C34878D82A}">
+                    <a16:rowId xmlns:a16="http://schemas.microsoft.com/office/drawing/2014/main" val="1320869910"/>
+                  </a:ext>
+                </a:extLst>
+              </a:tr>
+              <a:tr h="904392">
+                <a:tc>
+                  <a:txBody>
+                    <a:bodyPr/>
+                    <a:lstStyle/>
+                    <a:p>
+                      <a:pPr marL="0" marR="0" lvl="0" indent="0" algn="ctr" defTabSz="914400" rtl="0" eaLnBrk="1" fontAlgn="auto" latinLnBrk="0" hangingPunct="1">
+                        <a:lnSpc>
+                          <a:spcPct val="100000"/>
+                        </a:lnSpc>
+                        <a:spcBef>
+                          <a:spcPts val="0"/>
+                        </a:spcBef>
+                        <a:spcAft>
+                          <a:spcPts val="0"/>
+                        </a:spcAft>
+                        <a:buClrTx/>
+                        <a:buSzTx/>
+                        <a:buFontTx/>
+                        <a:buNone/>
+                        <a:tabLst/>
+                        <a:defRPr/>
+                      </a:pPr>
+                      <a:r>
+                        <a:rPr lang="de-AT" dirty="0"/>
+                        <a:t>Alle Tokens von </a:t>
+                      </a:r>
+                      <a:r>
+                        <a:rPr lang="de-AT" i="1" dirty="0"/>
+                        <a:t>Token Endpunkt</a:t>
+                      </a:r>
+                      <a:endParaRPr lang="en-US" i="1" dirty="0"/>
+                    </a:p>
+                  </a:txBody>
+                  <a:tcPr anchor="ctr">
+                    <a:solidFill>
+                      <a:schemeClr val="bg1">
+                        <a:lumMod val="85000"/>
+                      </a:schemeClr>
+                    </a:solidFill>
+                  </a:tcPr>
+                </a:tc>
+                <a:tc>
+                  <a:txBody>
+                    <a:bodyPr/>
+                    <a:lstStyle/>
+                    <a:p>
+                      <a:pPr algn="ctr"/>
+                      <a:r>
+                        <a:rPr lang="de-AT" dirty="0"/>
+                        <a:t>X</a:t>
+                      </a:r>
+                      <a:endParaRPr lang="en-US" dirty="0"/>
+                    </a:p>
+                  </a:txBody>
+                  <a:tcPr anchor="ctr"/>
+                </a:tc>
+                <a:tc>
+                  <a:txBody>
+                    <a:bodyPr/>
+                    <a:lstStyle/>
+                    <a:p>
+                      <a:pPr algn="ctr"/>
+                      <a:r>
+                        <a:rPr lang="de-AT" dirty="0"/>
+                        <a:t>X</a:t>
+                      </a:r>
+                      <a:endParaRPr lang="en-US" dirty="0"/>
+                    </a:p>
+                  </a:txBody>
+                  <a:tcPr anchor="ctr"/>
+                </a:tc>
+                <a:tc>
+                  <a:txBody>
+                    <a:bodyPr/>
+                    <a:lstStyle/>
+                    <a:p>
+                      <a:pPr algn="ctr"/>
+                      <a:r>
+                        <a:rPr lang="de-AT" dirty="0"/>
+                        <a:t>X</a:t>
+                      </a:r>
+                      <a:endParaRPr lang="en-US" dirty="0"/>
+                    </a:p>
+                  </a:txBody>
+                  <a:tcPr anchor="ctr"/>
+                </a:tc>
+                <a:tc>
+                  <a:txBody>
+                    <a:bodyPr/>
+                    <a:lstStyle/>
+                    <a:p>
+                      <a:pPr algn="ctr"/>
+                      <a:endParaRPr lang="en-US" dirty="0"/>
+                    </a:p>
+                  </a:txBody>
+                  <a:tcPr anchor="ctr"/>
+                </a:tc>
+                <a:tc>
+                  <a:txBody>
+                    <a:bodyPr/>
+                    <a:lstStyle/>
+                    <a:p>
+                      <a:pPr algn="ctr"/>
+                      <a:endParaRPr lang="en-US" dirty="0"/>
+                    </a:p>
+                  </a:txBody>
+                  <a:tcPr anchor="ctr"/>
+                </a:tc>
+                <a:tc>
+                  <a:txBody>
+                    <a:bodyPr/>
+                    <a:lstStyle/>
+                    <a:p>
+                      <a:pPr algn="ctr"/>
+                      <a:r>
+                        <a:rPr lang="de-AT" dirty="0"/>
+                        <a:t>X</a:t>
+                      </a:r>
+                      <a:endParaRPr lang="en-US" dirty="0"/>
+                    </a:p>
+                  </a:txBody>
+                  <a:tcPr anchor="ctr"/>
+                </a:tc>
+                <a:extLst>
+                  <a:ext uri="{0D108BD9-81ED-4DB2-BD59-A6C34878D82A}">
+                    <a16:rowId xmlns:a16="http://schemas.microsoft.com/office/drawing/2014/main" val="685321953"/>
+                  </a:ext>
+                </a:extLst>
+              </a:tr>
+              <a:tr h="904392">
+                <a:tc>
+                  <a:txBody>
+                    <a:bodyPr/>
+                    <a:lstStyle/>
+                    <a:p>
+                      <a:pPr marL="0" marR="0" lvl="0" indent="0" algn="ctr" defTabSz="914400" rtl="0" eaLnBrk="1" fontAlgn="auto" latinLnBrk="0" hangingPunct="1">
+                        <a:lnSpc>
+                          <a:spcPct val="100000"/>
+                        </a:lnSpc>
+                        <a:spcBef>
+                          <a:spcPts val="0"/>
+                        </a:spcBef>
+                        <a:spcAft>
+                          <a:spcPts val="0"/>
+                        </a:spcAft>
+                        <a:buClrTx/>
+                        <a:buSzTx/>
+                        <a:buFontTx/>
+                        <a:buNone/>
+                        <a:tabLst/>
+                        <a:defRPr/>
+                      </a:pPr>
+                      <a:r>
+                        <a:rPr lang="de-AT" i="0" dirty="0"/>
+                        <a:t>Tokens über User Agent gesendet</a:t>
+                      </a:r>
+                      <a:endParaRPr lang="en-US" i="0" dirty="0"/>
+                    </a:p>
+                  </a:txBody>
+                  <a:tcPr anchor="ctr">
+                    <a:solidFill>
+                      <a:schemeClr val="bg1">
+                        <a:lumMod val="85000"/>
+                      </a:schemeClr>
+                    </a:solidFill>
+                  </a:tcPr>
+                </a:tc>
+                <a:tc>
+                  <a:txBody>
+                    <a:bodyPr/>
+                    <a:lstStyle/>
+                    <a:p>
+                      <a:pPr algn="ctr"/>
+                      <a:endParaRPr lang="de-AT" dirty="0"/>
+                    </a:p>
+                  </a:txBody>
+                  <a:tcPr anchor="ctr"/>
+                </a:tc>
+                <a:tc>
+                  <a:txBody>
+                    <a:bodyPr/>
+                    <a:lstStyle/>
+                    <a:p>
+                      <a:pPr algn="ctr"/>
+                      <a:endParaRPr lang="en-US" dirty="0"/>
+                    </a:p>
+                  </a:txBody>
+                  <a:tcPr anchor="ctr"/>
+                </a:tc>
+                <a:tc>
+                  <a:txBody>
+                    <a:bodyPr/>
+                    <a:lstStyle/>
+                    <a:p>
+                      <a:pPr algn="ctr"/>
+                      <a:endParaRPr lang="en-US" dirty="0"/>
+                    </a:p>
+                  </a:txBody>
+                  <a:tcPr anchor="ctr"/>
+                </a:tc>
+                <a:tc>
+                  <a:txBody>
+                    <a:bodyPr/>
+                    <a:lstStyle/>
+                    <a:p>
+                      <a:pPr algn="ctr"/>
+                      <a:r>
+                        <a:rPr lang="de-AT" dirty="0"/>
+                        <a:t>X</a:t>
+                      </a:r>
+                      <a:endParaRPr lang="en-US" dirty="0"/>
+                    </a:p>
+                  </a:txBody>
+                  <a:tcPr anchor="ctr"/>
+                </a:tc>
+                <a:tc>
+                  <a:txBody>
+                    <a:bodyPr/>
+                    <a:lstStyle/>
+                    <a:p>
+                      <a:pPr algn="ctr"/>
+                      <a:r>
+                        <a:rPr lang="de-AT" dirty="0"/>
+                        <a:t>X</a:t>
+                      </a:r>
+                      <a:endParaRPr lang="en-US" dirty="0"/>
+                    </a:p>
+                  </a:txBody>
+                  <a:tcPr anchor="ctr"/>
+                </a:tc>
+                <a:tc>
+                  <a:txBody>
+                    <a:bodyPr/>
+                    <a:lstStyle/>
+                    <a:p>
+                      <a:pPr algn="ctr"/>
+                      <a:endParaRPr lang="en-US" dirty="0"/>
+                    </a:p>
+                  </a:txBody>
+                  <a:tcPr anchor="ctr"/>
+                </a:tc>
+                <a:extLst>
+                  <a:ext uri="{0D108BD9-81ED-4DB2-BD59-A6C34878D82A}">
+                    <a16:rowId xmlns:a16="http://schemas.microsoft.com/office/drawing/2014/main" val="356802342"/>
+                  </a:ext>
+                </a:extLst>
+              </a:tr>
+              <a:tr h="683557">
+                <a:tc>
+                  <a:txBody>
+                    <a:bodyPr/>
+                    <a:lstStyle/>
+                    <a:p>
+                      <a:pPr marL="0" marR="0" lvl="0" indent="0" algn="ctr" defTabSz="914400" rtl="0" eaLnBrk="1" fontAlgn="auto" latinLnBrk="0" hangingPunct="1">
+                        <a:lnSpc>
+                          <a:spcPct val="100000"/>
+                        </a:lnSpc>
+                        <a:spcBef>
+                          <a:spcPts val="0"/>
+                        </a:spcBef>
+                        <a:spcAft>
+                          <a:spcPts val="0"/>
+                        </a:spcAft>
+                        <a:buClrTx/>
+                        <a:buSzTx/>
+                        <a:buFontTx/>
+                        <a:buNone/>
+                        <a:tabLst/>
+                        <a:defRPr/>
+                      </a:pPr>
+                      <a:r>
+                        <a:rPr lang="de-AT" i="1" dirty="0"/>
+                        <a:t>Refresh Token </a:t>
+                      </a:r>
+                      <a:r>
+                        <a:rPr lang="de-AT" i="0" dirty="0"/>
+                        <a:t>unterstützt</a:t>
+                      </a:r>
+                      <a:endParaRPr lang="en-US" i="0" dirty="0"/>
+                    </a:p>
+                  </a:txBody>
+                  <a:tcPr anchor="ctr">
+                    <a:solidFill>
+                      <a:schemeClr val="bg1">
+                        <a:lumMod val="85000"/>
+                      </a:schemeClr>
+                    </a:solidFill>
+                  </a:tcPr>
+                </a:tc>
+                <a:tc>
+                  <a:txBody>
+                    <a:bodyPr/>
+                    <a:lstStyle/>
+                    <a:p>
+                      <a:pPr algn="ctr"/>
+                      <a:endParaRPr lang="de-AT" dirty="0"/>
+                    </a:p>
+                  </a:txBody>
+                  <a:tcPr anchor="ctr"/>
+                </a:tc>
+                <a:tc>
+                  <a:txBody>
+                    <a:bodyPr/>
+                    <a:lstStyle/>
+                    <a:p>
+                      <a:pPr algn="ctr"/>
+                      <a:r>
+                        <a:rPr lang="de-AT" dirty="0"/>
+                        <a:t>X</a:t>
+                      </a:r>
+                      <a:endParaRPr lang="en-US" dirty="0"/>
+                    </a:p>
+                  </a:txBody>
+                  <a:tcPr anchor="ctr"/>
+                </a:tc>
+                <a:tc>
+                  <a:txBody>
+                    <a:bodyPr/>
+                    <a:lstStyle/>
+                    <a:p>
+                      <a:pPr algn="ctr"/>
+                      <a:r>
+                        <a:rPr lang="de-AT" dirty="0"/>
+                        <a:t>X</a:t>
+                      </a:r>
+                      <a:endParaRPr lang="en-US" dirty="0"/>
+                    </a:p>
+                  </a:txBody>
+                  <a:tcPr anchor="ctr"/>
+                </a:tc>
+                <a:tc>
+                  <a:txBody>
+                    <a:bodyPr/>
+                    <a:lstStyle/>
+                    <a:p>
+                      <a:pPr algn="ctr"/>
+                      <a:endParaRPr lang="en-US" dirty="0"/>
+                    </a:p>
+                  </a:txBody>
+                  <a:tcPr anchor="ctr"/>
+                </a:tc>
+                <a:tc>
+                  <a:txBody>
+                    <a:bodyPr/>
+                    <a:lstStyle/>
+                    <a:p>
+                      <a:pPr algn="ctr"/>
+                      <a:r>
+                        <a:rPr lang="de-AT" dirty="0"/>
+                        <a:t>X</a:t>
+                      </a:r>
+                    </a:p>
+                  </a:txBody>
+                  <a:tcPr anchor="ctr"/>
+                </a:tc>
+                <a:tc>
+                  <a:txBody>
+                    <a:bodyPr/>
+                    <a:lstStyle/>
+                    <a:p>
+                      <a:pPr algn="ctr"/>
+                      <a:r>
+                        <a:rPr lang="de-AT" dirty="0"/>
+                        <a:t>X</a:t>
+                      </a:r>
+                    </a:p>
+                  </a:txBody>
+                  <a:tcPr anchor="ctr"/>
+                </a:tc>
+                <a:extLst>
+                  <a:ext uri="{0D108BD9-81ED-4DB2-BD59-A6C34878D82A}">
+                    <a16:rowId xmlns:a16="http://schemas.microsoft.com/office/drawing/2014/main" val="1447987830"/>
+                  </a:ext>
+                </a:extLst>
+              </a:tr>
+              <a:tr h="683557">
+                <a:tc>
+                  <a:txBody>
+                    <a:bodyPr/>
+                    <a:lstStyle/>
+                    <a:p>
+                      <a:pPr marL="0" marR="0" lvl="0" indent="0" algn="ctr" defTabSz="914400" rtl="0" eaLnBrk="1" fontAlgn="auto" latinLnBrk="0" hangingPunct="1">
+                        <a:lnSpc>
+                          <a:spcPct val="100000"/>
+                        </a:lnSpc>
+                        <a:spcBef>
+                          <a:spcPts val="0"/>
+                        </a:spcBef>
+                        <a:spcAft>
+                          <a:spcPts val="0"/>
+                        </a:spcAft>
+                        <a:buClrTx/>
+                        <a:buSzTx/>
+                        <a:buFontTx/>
+                        <a:buNone/>
+                        <a:tabLst/>
+                        <a:defRPr/>
+                      </a:pPr>
+                      <a:r>
+                        <a:rPr lang="de-AT" i="0" dirty="0"/>
+                        <a:t>Token via ein einziges </a:t>
+                      </a:r>
+                      <a:r>
+                        <a:rPr lang="de-AT" i="0" dirty="0" err="1"/>
+                        <a:t>Roundtrip</a:t>
+                      </a:r>
+                      <a:endParaRPr lang="en-US" i="0" dirty="0"/>
+                    </a:p>
+                  </a:txBody>
+                  <a:tcPr anchor="ctr">
+                    <a:solidFill>
+                      <a:schemeClr val="bg1">
+                        <a:lumMod val="85000"/>
+                      </a:schemeClr>
+                    </a:solidFill>
+                  </a:tcPr>
+                </a:tc>
+                <a:tc>
+                  <a:txBody>
+                    <a:bodyPr/>
+                    <a:lstStyle/>
+                    <a:p>
+                      <a:pPr algn="ctr"/>
+                      <a:r>
+                        <a:rPr lang="de-AT" dirty="0"/>
+                        <a:t>X</a:t>
+                      </a:r>
+                    </a:p>
+                  </a:txBody>
+                  <a:tcPr anchor="ctr"/>
+                </a:tc>
+                <a:tc>
+                  <a:txBody>
+                    <a:bodyPr/>
+                    <a:lstStyle/>
+                    <a:p>
+                      <a:pPr algn="ctr"/>
+                      <a:r>
+                        <a:rPr lang="de-AT" dirty="0"/>
+                        <a:t>X</a:t>
+                      </a:r>
+                      <a:endParaRPr lang="en-US" dirty="0"/>
+                    </a:p>
+                  </a:txBody>
+                  <a:tcPr anchor="ctr"/>
+                </a:tc>
+                <a:tc>
+                  <a:txBody>
+                    <a:bodyPr/>
+                    <a:lstStyle/>
+                    <a:p>
+                      <a:pPr algn="ctr"/>
+                      <a:endParaRPr lang="en-US" dirty="0"/>
+                    </a:p>
+                  </a:txBody>
+                  <a:tcPr anchor="ctr"/>
+                </a:tc>
+                <a:tc>
+                  <a:txBody>
+                    <a:bodyPr/>
+                    <a:lstStyle/>
+                    <a:p>
+                      <a:pPr algn="ctr"/>
+                      <a:r>
+                        <a:rPr lang="de-AT" dirty="0"/>
+                        <a:t>X</a:t>
+                      </a:r>
+                      <a:endParaRPr lang="en-US" dirty="0"/>
+                    </a:p>
+                  </a:txBody>
+                  <a:tcPr anchor="ctr"/>
+                </a:tc>
+                <a:tc>
+                  <a:txBody>
+                    <a:bodyPr/>
+                    <a:lstStyle/>
+                    <a:p>
+                      <a:pPr algn="ctr"/>
+                      <a:endParaRPr lang="de-AT" dirty="0"/>
+                    </a:p>
+                  </a:txBody>
+                  <a:tcPr anchor="ctr"/>
+                </a:tc>
+                <a:tc>
+                  <a:txBody>
+                    <a:bodyPr/>
+                    <a:lstStyle/>
+                    <a:p>
+                      <a:pPr algn="ctr"/>
+                      <a:endParaRPr lang="de-AT" dirty="0"/>
+                    </a:p>
+                  </a:txBody>
+                  <a:tcPr anchor="ctr"/>
+                </a:tc>
+                <a:extLst>
+                  <a:ext uri="{0D108BD9-81ED-4DB2-BD59-A6C34878D82A}">
+                    <a16:rowId xmlns:a16="http://schemas.microsoft.com/office/drawing/2014/main" val="757970485"/>
+                  </a:ext>
+                </a:extLst>
+              </a:tr>
+            </a:tbl>
+          </a:graphicData>
+        </a:graphic>
+      </p:graphicFrame>
+    </p:spTree>
+    <p:extLst>
+      <p:ext uri="{BB962C8B-B14F-4D97-AF65-F5344CB8AC3E}">
+        <p14:creationId xmlns:p14="http://schemas.microsoft.com/office/powerpoint/2010/main" val="3957468252"/>
+      </p:ext>
+    </p:extLst>
+  </p:cSld>
+  <p:clrMapOvr>
+    <a:masterClrMapping/>
+  </p:clrMapOvr>
+</p:sld>
+</file>
+
+<file path=ppt/slides/slide51.xml><?xml version="1.0" encoding="utf-8"?>
+<p:sld xmlns:a="http://schemas.openxmlformats.org/drawingml/2006/main" xmlns:r="http://schemas.openxmlformats.org/officeDocument/2006/relationships" xmlns:p="http://schemas.openxmlformats.org/presentationml/2006/main">
+  <p:cSld>
+    <p:spTree>
+      <p:nvGrpSpPr>
+        <p:cNvPr id="1" name=""/>
+        <p:cNvGrpSpPr/>
+        <p:nvPr/>
+      </p:nvGrpSpPr>
+      <p:grpSpPr>
+        <a:xfrm>
+          <a:off x="0" y="0"/>
+          <a:ext cx="0" cy="0"/>
+          <a:chOff x="0" y="0"/>
+          <a:chExt cx="0" cy="0"/>
+        </a:xfrm>
+      </p:grpSpPr>
+      <p:sp>
+        <p:nvSpPr>
+          <p:cNvPr id="2" name="Title 1">
+            <a:extLst>
+              <a:ext uri="{FF2B5EF4-FFF2-40B4-BE49-F238E27FC236}">
+                <a16:creationId xmlns:a16="http://schemas.microsoft.com/office/drawing/2014/main" id="{348397C1-A147-42F6-8AF5-33AF5868C7CC}"/>
+              </a:ext>
+            </a:extLst>
+          </p:cNvPr>
+          <p:cNvSpPr>
+            <a:spLocks noGrp="1"/>
+          </p:cNvSpPr>
+          <p:nvPr>
+            <p:ph type="title"/>
+          </p:nvPr>
+        </p:nvSpPr>
+        <p:spPr/>
+        <p:txBody>
+          <a:bodyPr/>
+          <a:lstStyle/>
+          <a:p>
+            <a:r>
+              <a:rPr lang="de-AT" dirty="0"/>
+              <a:t>Zusammenfassung </a:t>
+            </a:r>
+            <a:r>
+              <a:rPr lang="de-AT" dirty="0" err="1">
+                <a:latin typeface="Consolas" panose="020B0609020204030204" pitchFamily="49" charset="0"/>
+              </a:rPr>
+              <a:t>grant_type</a:t>
+            </a:r>
+            <a:r>
+              <a:rPr lang="de-AT" sz="4000" dirty="0" err="1">
+                <a:latin typeface="+mn-lt"/>
+              </a:rPr>
+              <a:t>s</a:t>
+            </a:r>
+            <a:endParaRPr lang="en-US" dirty="0">
+              <a:latin typeface="+mn-lt"/>
+            </a:endParaRPr>
+          </a:p>
+        </p:txBody>
+      </p:sp>
+      <p:graphicFrame>
+        <p:nvGraphicFramePr>
+          <p:cNvPr id="3" name="Table 2">
+            <a:extLst>
+              <a:ext uri="{FF2B5EF4-FFF2-40B4-BE49-F238E27FC236}">
+                <a16:creationId xmlns:a16="http://schemas.microsoft.com/office/drawing/2014/main" id="{92A1B128-AAB2-47F0-9CD1-9CCC30105557}"/>
+              </a:ext>
+            </a:extLst>
+          </p:cNvPr>
+          <p:cNvGraphicFramePr>
+            <a:graphicFrameLocks noGrp="1"/>
+          </p:cNvGraphicFramePr>
+          <p:nvPr>
+            <p:extLst>
+              <p:ext uri="{D42A27DB-BD31-4B8C-83A1-F6EECF244321}">
+                <p14:modId xmlns:p14="http://schemas.microsoft.com/office/powerpoint/2010/main" val="741432363"/>
+              </p:ext>
+            </p:extLst>
+          </p:nvPr>
+        </p:nvGraphicFramePr>
+        <p:xfrm>
+          <a:off x="3897834" y="1690688"/>
+          <a:ext cx="4396332" cy="4710784"/>
+        </p:xfrm>
+        <a:graphic>
+          <a:graphicData uri="http://schemas.openxmlformats.org/drawingml/2006/table">
+            <a:tbl>
+              <a:tblPr firstRow="1" bandRow="1">
+                <a:tableStyleId>{5940675A-B579-460E-94D1-54222C63F5DA}</a:tableStyleId>
+              </a:tblPr>
+              <a:tblGrid>
+                <a:gridCol w="2198166">
+                  <a:extLst>
+                    <a:ext uri="{9D8B030D-6E8A-4147-A177-3AD203B41FA5}">
+                      <a16:colId xmlns:a16="http://schemas.microsoft.com/office/drawing/2014/main" val="1929636500"/>
+                    </a:ext>
+                  </a:extLst>
+                </a:gridCol>
+                <a:gridCol w="2198166">
+                  <a:extLst>
+                    <a:ext uri="{9D8B030D-6E8A-4147-A177-3AD203B41FA5}">
+                      <a16:colId xmlns:a16="http://schemas.microsoft.com/office/drawing/2014/main" val="395898648"/>
+                    </a:ext>
+                  </a:extLst>
+                </a:gridCol>
+              </a:tblGrid>
+              <a:tr h="611391">
+                <a:tc>
+                  <a:txBody>
+                    <a:bodyPr/>
+                    <a:lstStyle/>
+                    <a:p>
+                      <a:pPr algn="ctr"/>
+                      <a:endParaRPr lang="en-US" sz="1500" dirty="0">
+                        <a:solidFill>
+                          <a:schemeClr val="bg1"/>
+                        </a:solidFill>
+                      </a:endParaRPr>
+                    </a:p>
+                  </a:txBody>
+                  <a:tcPr marL="75428" marR="75428" marT="37714" marB="37714" anchor="ctr">
+                    <a:solidFill>
+                      <a:schemeClr val="tx1"/>
+                    </a:solidFill>
+                  </a:tcPr>
+                </a:tc>
+                <a:tc>
+                  <a:txBody>
+                    <a:bodyPr/>
+                    <a:lstStyle/>
+                    <a:p>
+                      <a:pPr algn="ctr"/>
+                      <a:r>
+                        <a:rPr lang="de-AT" sz="1500" dirty="0" err="1">
+                          <a:solidFill>
+                            <a:schemeClr val="bg1"/>
+                          </a:solidFill>
+                        </a:rPr>
+                        <a:t>grant_type</a:t>
+                      </a:r>
+                      <a:endParaRPr lang="en-US" sz="1500" dirty="0">
+                        <a:solidFill>
+                          <a:schemeClr val="bg1"/>
+                        </a:solidFill>
+                      </a:endParaRPr>
+                    </a:p>
+                  </a:txBody>
+                  <a:tcPr marL="75428" marR="75428" marT="37714" marB="37714" anchor="ctr">
+                    <a:solidFill>
+                      <a:schemeClr val="tx1"/>
+                    </a:solidFill>
+                  </a:tcPr>
+                </a:tc>
+                <a:extLst>
+                  <a:ext uri="{0D108BD9-81ED-4DB2-BD59-A6C34878D82A}">
+                    <a16:rowId xmlns:a16="http://schemas.microsoft.com/office/drawing/2014/main" val="1928875511"/>
+                  </a:ext>
+                </a:extLst>
+              </a:tr>
+              <a:tr h="751996">
+                <a:tc>
+                  <a:txBody>
+                    <a:bodyPr/>
+                    <a:lstStyle/>
+                    <a:p>
+                      <a:pPr algn="ctr"/>
+                      <a:r>
+                        <a:rPr lang="de-AT" sz="1500" i="0" dirty="0"/>
+                        <a:t>Client </a:t>
+                      </a:r>
+                      <a:r>
+                        <a:rPr lang="de-AT" sz="1500" i="0" dirty="0" err="1"/>
+                        <a:t>Credential</a:t>
+                      </a:r>
+                      <a:r>
+                        <a:rPr lang="de-AT" sz="1500" i="0" dirty="0"/>
+                        <a:t> Grant</a:t>
+                      </a:r>
+                      <a:endParaRPr lang="en-US" sz="1500" i="0" dirty="0"/>
+                    </a:p>
+                  </a:txBody>
+                  <a:tcPr marL="75428" marR="75428" marT="37714" marB="37714" anchor="ctr">
+                    <a:solidFill>
+                      <a:schemeClr val="bg1">
+                        <a:lumMod val="85000"/>
+                      </a:schemeClr>
+                    </a:solidFill>
+                  </a:tcPr>
+                </a:tc>
+                <a:tc>
+                  <a:txBody>
+                    <a:bodyPr/>
+                    <a:lstStyle/>
+                    <a:p>
+                      <a:pPr algn="l"/>
+                      <a:r>
+                        <a:rPr lang="de-AT" sz="1500" dirty="0" err="1">
+                          <a:latin typeface="Consolas" panose="020B0609020204030204" pitchFamily="49" charset="0"/>
+                        </a:rPr>
+                        <a:t>client_credential</a:t>
+                      </a:r>
+                      <a:endParaRPr lang="en-US" sz="1500" dirty="0">
+                        <a:latin typeface="Consolas" panose="020B0609020204030204" pitchFamily="49" charset="0"/>
+                      </a:endParaRPr>
+                    </a:p>
+                  </a:txBody>
+                  <a:tcPr marL="75428" marR="75428" marT="37714" marB="37714" anchor="ctr"/>
+                </a:tc>
+                <a:extLst>
+                  <a:ext uri="{0D108BD9-81ED-4DB2-BD59-A6C34878D82A}">
+                    <a16:rowId xmlns:a16="http://schemas.microsoft.com/office/drawing/2014/main" val="1320869910"/>
+                  </a:ext>
+                </a:extLst>
+              </a:tr>
+              <a:tr h="751996">
+                <a:tc>
+                  <a:txBody>
+                    <a:bodyPr/>
+                    <a:lstStyle/>
+                    <a:p>
+                      <a:pPr marL="0" marR="0" lvl="0" indent="0" algn="ctr" defTabSz="914400" rtl="0" eaLnBrk="1" fontAlgn="auto" latinLnBrk="0" hangingPunct="1">
+                        <a:lnSpc>
+                          <a:spcPct val="100000"/>
+                        </a:lnSpc>
+                        <a:spcBef>
+                          <a:spcPts val="0"/>
+                        </a:spcBef>
+                        <a:spcAft>
+                          <a:spcPts val="0"/>
+                        </a:spcAft>
+                        <a:buClrTx/>
+                        <a:buSzTx/>
+                        <a:buFontTx/>
+                        <a:buNone/>
+                        <a:tabLst/>
+                        <a:defRPr/>
+                      </a:pPr>
+                      <a:r>
+                        <a:rPr lang="de-AT" sz="1500" i="0" dirty="0" err="1"/>
+                        <a:t>Resource</a:t>
+                      </a:r>
+                      <a:r>
+                        <a:rPr lang="de-AT" sz="1500" i="0" dirty="0"/>
+                        <a:t> </a:t>
+                      </a:r>
+                      <a:r>
+                        <a:rPr lang="de-AT" sz="1500" i="0" dirty="0" err="1"/>
+                        <a:t>Owner</a:t>
+                      </a:r>
+                      <a:r>
+                        <a:rPr lang="de-AT" sz="1500" i="0" dirty="0"/>
+                        <a:t> Password Grant</a:t>
+                      </a:r>
+                      <a:endParaRPr lang="en-US" sz="1500" i="0" dirty="0"/>
+                    </a:p>
+                  </a:txBody>
+                  <a:tcPr marL="75428" marR="75428" marT="37714" marB="37714" anchor="ctr">
+                    <a:solidFill>
+                      <a:schemeClr val="bg1">
+                        <a:lumMod val="85000"/>
+                      </a:schemeClr>
+                    </a:solidFill>
+                  </a:tcPr>
+                </a:tc>
+                <a:tc>
+                  <a:txBody>
+                    <a:bodyPr/>
+                    <a:lstStyle/>
+                    <a:p>
+                      <a:pPr algn="l"/>
+                      <a:r>
+                        <a:rPr lang="de-AT" sz="1500" dirty="0" err="1">
+                          <a:latin typeface="Consolas" panose="020B0609020204030204" pitchFamily="49" charset="0"/>
+                        </a:rPr>
+                        <a:t>password</a:t>
+                      </a:r>
+                      <a:endParaRPr lang="en-US" sz="1500" dirty="0">
+                        <a:latin typeface="Consolas" panose="020B0609020204030204" pitchFamily="49" charset="0"/>
+                      </a:endParaRPr>
+                    </a:p>
+                  </a:txBody>
+                  <a:tcPr marL="75428" marR="75428" marT="37714" marB="37714" anchor="ctr"/>
+                </a:tc>
+                <a:extLst>
+                  <a:ext uri="{0D108BD9-81ED-4DB2-BD59-A6C34878D82A}">
+                    <a16:rowId xmlns:a16="http://schemas.microsoft.com/office/drawing/2014/main" val="685321953"/>
+                  </a:ext>
+                </a:extLst>
+              </a:tr>
+              <a:tr h="611391">
+                <a:tc>
+                  <a:txBody>
+                    <a:bodyPr/>
+                    <a:lstStyle/>
+                    <a:p>
+                      <a:pPr marL="0" marR="0" lvl="0" indent="0" algn="ctr" defTabSz="914400" rtl="0" eaLnBrk="1" fontAlgn="auto" latinLnBrk="0" hangingPunct="1">
+                        <a:lnSpc>
+                          <a:spcPct val="100000"/>
+                        </a:lnSpc>
+                        <a:spcBef>
+                          <a:spcPts val="0"/>
+                        </a:spcBef>
+                        <a:spcAft>
+                          <a:spcPts val="0"/>
+                        </a:spcAft>
+                        <a:buClrTx/>
+                        <a:buSzTx/>
+                        <a:buFontTx/>
+                        <a:buNone/>
+                        <a:tabLst/>
+                        <a:defRPr/>
+                      </a:pPr>
+                      <a:r>
+                        <a:rPr lang="de-AT" sz="1500" i="0" dirty="0" err="1"/>
+                        <a:t>Authorization</a:t>
+                      </a:r>
+                      <a:r>
+                        <a:rPr lang="de-AT" sz="1500" i="0" dirty="0"/>
+                        <a:t> Code Flow</a:t>
+                      </a:r>
+                      <a:endParaRPr lang="en-US" sz="1500" i="0" dirty="0"/>
+                    </a:p>
+                  </a:txBody>
+                  <a:tcPr marL="75428" marR="75428" marT="37714" marB="37714" anchor="ctr">
+                    <a:solidFill>
+                      <a:schemeClr val="bg1">
+                        <a:lumMod val="85000"/>
+                      </a:schemeClr>
+                    </a:solidFill>
+                  </a:tcPr>
+                </a:tc>
+                <a:tc>
+                  <a:txBody>
+                    <a:bodyPr/>
+                    <a:lstStyle/>
+                    <a:p>
+                      <a:pPr algn="l"/>
+                      <a:r>
+                        <a:rPr lang="de-AT" sz="1500" dirty="0">
+                          <a:latin typeface="Consolas" panose="020B0609020204030204" pitchFamily="49" charset="0"/>
+                        </a:rPr>
+                        <a:t>code</a:t>
+                      </a:r>
+                    </a:p>
+                  </a:txBody>
+                  <a:tcPr marL="75428" marR="75428" marT="37714" marB="37714" anchor="ctr"/>
+                </a:tc>
+                <a:extLst>
+                  <a:ext uri="{0D108BD9-81ED-4DB2-BD59-A6C34878D82A}">
+                    <a16:rowId xmlns:a16="http://schemas.microsoft.com/office/drawing/2014/main" val="356802342"/>
+                  </a:ext>
+                </a:extLst>
+              </a:tr>
+              <a:tr h="611391">
+                <a:tc>
+                  <a:txBody>
+                    <a:bodyPr/>
+                    <a:lstStyle/>
+                    <a:p>
+                      <a:pPr marL="0" marR="0" lvl="0" indent="0" algn="ctr" defTabSz="914400" rtl="0" eaLnBrk="1" fontAlgn="auto" latinLnBrk="0" hangingPunct="1">
+                        <a:lnSpc>
+                          <a:spcPct val="100000"/>
+                        </a:lnSpc>
+                        <a:spcBef>
+                          <a:spcPts val="0"/>
+                        </a:spcBef>
+                        <a:spcAft>
+                          <a:spcPts val="0"/>
+                        </a:spcAft>
+                        <a:buClrTx/>
+                        <a:buSzTx/>
+                        <a:buFontTx/>
+                        <a:buNone/>
+                        <a:tabLst/>
+                        <a:defRPr/>
+                      </a:pPr>
+                      <a:r>
+                        <a:rPr lang="de-AT" sz="1500" i="0" dirty="0" err="1"/>
+                        <a:t>Implicit</a:t>
+                      </a:r>
+                      <a:r>
+                        <a:rPr lang="de-AT" sz="1500" i="0" dirty="0"/>
+                        <a:t> </a:t>
+                      </a:r>
+                      <a:r>
+                        <a:rPr lang="de-AT" sz="1500" i="0"/>
+                        <a:t>Code Flow</a:t>
+                      </a:r>
+                      <a:endParaRPr lang="en-US" sz="1500" i="0" dirty="0"/>
+                    </a:p>
+                  </a:txBody>
+                  <a:tcPr marL="75428" marR="75428" marT="37714" marB="37714" anchor="ctr">
+                    <a:solidFill>
+                      <a:schemeClr val="bg1">
+                        <a:lumMod val="85000"/>
+                      </a:schemeClr>
+                    </a:solidFill>
+                  </a:tcPr>
+                </a:tc>
+                <a:tc>
+                  <a:txBody>
+                    <a:bodyPr/>
+                    <a:lstStyle/>
+                    <a:p>
+                      <a:pPr algn="l"/>
+                      <a:r>
+                        <a:rPr lang="de-AT" sz="1500" dirty="0" err="1">
+                          <a:latin typeface="Consolas" panose="020B0609020204030204" pitchFamily="49" charset="0"/>
+                        </a:rPr>
+                        <a:t>id_token</a:t>
+                      </a:r>
+                      <a:endParaRPr lang="de-AT" sz="1500" dirty="0">
+                        <a:latin typeface="Consolas" panose="020B0609020204030204" pitchFamily="49" charset="0"/>
+                      </a:endParaRPr>
+                    </a:p>
+                    <a:p>
+                      <a:pPr algn="l"/>
+                      <a:r>
+                        <a:rPr lang="de-AT" sz="1500" dirty="0" err="1">
+                          <a:latin typeface="Consolas" panose="020B0609020204030204" pitchFamily="49" charset="0"/>
+                        </a:rPr>
+                        <a:t>id_token</a:t>
+                      </a:r>
+                      <a:r>
+                        <a:rPr lang="de-AT" sz="1500" dirty="0">
+                          <a:latin typeface="Consolas" panose="020B0609020204030204" pitchFamily="49" charset="0"/>
+                        </a:rPr>
+                        <a:t> </a:t>
+                      </a:r>
+                      <a:r>
+                        <a:rPr lang="de-AT" sz="1500" dirty="0" err="1">
+                          <a:latin typeface="Consolas" panose="020B0609020204030204" pitchFamily="49" charset="0"/>
+                        </a:rPr>
+                        <a:t>token</a:t>
+                      </a:r>
+                      <a:endParaRPr lang="de-AT" sz="1500" dirty="0">
+                        <a:latin typeface="Consolas" panose="020B0609020204030204" pitchFamily="49" charset="0"/>
+                      </a:endParaRPr>
+                    </a:p>
+                  </a:txBody>
+                  <a:tcPr marL="75428" marR="75428" marT="37714" marB="37714" anchor="ctr"/>
+                </a:tc>
+                <a:extLst>
+                  <a:ext uri="{0D108BD9-81ED-4DB2-BD59-A6C34878D82A}">
+                    <a16:rowId xmlns:a16="http://schemas.microsoft.com/office/drawing/2014/main" val="1447987830"/>
+                  </a:ext>
+                </a:extLst>
+              </a:tr>
+              <a:tr h="754276">
+                <a:tc>
+                  <a:txBody>
+                    <a:bodyPr/>
+                    <a:lstStyle/>
+                    <a:p>
+                      <a:pPr marL="0" marR="0" lvl="0" indent="0" algn="ctr" defTabSz="914400" rtl="0" eaLnBrk="1" fontAlgn="auto" latinLnBrk="0" hangingPunct="1">
+                        <a:lnSpc>
+                          <a:spcPct val="100000"/>
+                        </a:lnSpc>
+                        <a:spcBef>
+                          <a:spcPts val="0"/>
+                        </a:spcBef>
+                        <a:spcAft>
+                          <a:spcPts val="0"/>
+                        </a:spcAft>
+                        <a:buClrTx/>
+                        <a:buSzTx/>
+                        <a:buFontTx/>
+                        <a:buNone/>
+                        <a:tabLst/>
+                        <a:defRPr/>
+                      </a:pPr>
+                      <a:r>
+                        <a:rPr lang="de-AT" sz="1500" i="0" dirty="0"/>
+                        <a:t>Hybrid Flow</a:t>
+                      </a:r>
+                      <a:endParaRPr lang="en-US" sz="1500" i="0" dirty="0"/>
+                    </a:p>
+                  </a:txBody>
+                  <a:tcPr marL="75428" marR="75428" marT="37714" marB="37714" anchor="ctr">
+                    <a:solidFill>
+                      <a:schemeClr val="bg1">
+                        <a:lumMod val="85000"/>
+                      </a:schemeClr>
+                    </a:solidFill>
+                  </a:tcPr>
+                </a:tc>
+                <a:tc>
+                  <a:txBody>
+                    <a:bodyPr/>
+                    <a:lstStyle/>
+                    <a:p>
+                      <a:pPr algn="l"/>
+                      <a:r>
+                        <a:rPr lang="de-AT" sz="1500" dirty="0">
+                          <a:latin typeface="Consolas" panose="020B0609020204030204" pitchFamily="49" charset="0"/>
+                        </a:rPr>
+                        <a:t>code </a:t>
+                      </a:r>
+                      <a:r>
+                        <a:rPr lang="de-AT" sz="1500" dirty="0" err="1">
+                          <a:latin typeface="Consolas" panose="020B0609020204030204" pitchFamily="49" charset="0"/>
+                        </a:rPr>
+                        <a:t>id_token</a:t>
+                      </a:r>
+                      <a:endParaRPr lang="de-AT" sz="1500" dirty="0">
+                        <a:latin typeface="Consolas" panose="020B0609020204030204" pitchFamily="49" charset="0"/>
+                      </a:endParaRPr>
+                    </a:p>
+                    <a:p>
+                      <a:pPr algn="l"/>
+                      <a:r>
+                        <a:rPr lang="de-AT" sz="1500" dirty="0">
+                          <a:latin typeface="Consolas" panose="020B0609020204030204" pitchFamily="49" charset="0"/>
+                        </a:rPr>
+                        <a:t>code </a:t>
+                      </a:r>
+                      <a:r>
+                        <a:rPr lang="de-AT" sz="1500" dirty="0" err="1">
+                          <a:latin typeface="Consolas" panose="020B0609020204030204" pitchFamily="49" charset="0"/>
+                        </a:rPr>
+                        <a:t>token</a:t>
+                      </a:r>
+                      <a:endParaRPr lang="de-AT" sz="1500" dirty="0">
+                        <a:latin typeface="Consolas" panose="020B0609020204030204" pitchFamily="49" charset="0"/>
+                      </a:endParaRPr>
+                    </a:p>
+                    <a:p>
+                      <a:pPr algn="l"/>
+                      <a:r>
+                        <a:rPr lang="de-AT" sz="1500" dirty="0" err="1">
+                          <a:latin typeface="Consolas" panose="020B0609020204030204" pitchFamily="49" charset="0"/>
+                        </a:rPr>
+                        <a:t>code</a:t>
+                      </a:r>
+                      <a:r>
+                        <a:rPr lang="de-AT" sz="1500" dirty="0">
+                          <a:latin typeface="Consolas" panose="020B0609020204030204" pitchFamily="49" charset="0"/>
+                        </a:rPr>
+                        <a:t> </a:t>
+                      </a:r>
+                      <a:r>
+                        <a:rPr lang="de-AT" sz="1500" dirty="0" err="1">
+                          <a:latin typeface="Consolas" panose="020B0609020204030204" pitchFamily="49" charset="0"/>
+                        </a:rPr>
+                        <a:t>id_token</a:t>
+                      </a:r>
+                      <a:r>
+                        <a:rPr lang="de-AT" sz="1500" dirty="0">
+                          <a:latin typeface="Consolas" panose="020B0609020204030204" pitchFamily="49" charset="0"/>
+                        </a:rPr>
+                        <a:t> </a:t>
+                      </a:r>
+                      <a:r>
+                        <a:rPr lang="de-AT" sz="1500" dirty="0" err="1">
+                          <a:latin typeface="Consolas" panose="020B0609020204030204" pitchFamily="49" charset="0"/>
+                        </a:rPr>
+                        <a:t>token</a:t>
+                      </a:r>
+                      <a:endParaRPr lang="de-AT" sz="1500" dirty="0">
+                        <a:latin typeface="Consolas" panose="020B0609020204030204" pitchFamily="49" charset="0"/>
+                      </a:endParaRPr>
+                    </a:p>
+                  </a:txBody>
+                  <a:tcPr marL="75428" marR="75428" marT="37714" marB="37714" anchor="ctr"/>
+                </a:tc>
+                <a:extLst>
+                  <a:ext uri="{0D108BD9-81ED-4DB2-BD59-A6C34878D82A}">
+                    <a16:rowId xmlns:a16="http://schemas.microsoft.com/office/drawing/2014/main" val="757970485"/>
+                  </a:ext>
+                </a:extLst>
+              </a:tr>
+              <a:tr h="611391">
+                <a:tc>
+                  <a:txBody>
+                    <a:bodyPr/>
+                    <a:lstStyle/>
+                    <a:p>
+                      <a:pPr marL="0" marR="0" lvl="0" indent="0" algn="ctr" defTabSz="914400" rtl="0" eaLnBrk="1" fontAlgn="auto" latinLnBrk="0" hangingPunct="1">
+                        <a:lnSpc>
+                          <a:spcPct val="100000"/>
+                        </a:lnSpc>
+                        <a:spcBef>
+                          <a:spcPts val="0"/>
+                        </a:spcBef>
+                        <a:spcAft>
+                          <a:spcPts val="0"/>
+                        </a:spcAft>
+                        <a:buClrTx/>
+                        <a:buSzTx/>
+                        <a:buFontTx/>
+                        <a:buNone/>
+                        <a:tabLst/>
+                        <a:defRPr/>
+                      </a:pPr>
+                      <a:r>
+                        <a:rPr lang="de-AT" sz="1500" i="0" dirty="0"/>
+                        <a:t>Device </a:t>
+                      </a:r>
+                      <a:r>
+                        <a:rPr lang="de-AT" sz="1500" i="0" dirty="0" err="1"/>
+                        <a:t>Authorization</a:t>
+                      </a:r>
+                      <a:r>
+                        <a:rPr lang="de-AT" sz="1500" i="0" dirty="0"/>
+                        <a:t> Grant</a:t>
+                      </a:r>
+                      <a:endParaRPr lang="en-US" sz="1500" i="0" dirty="0"/>
+                    </a:p>
+                  </a:txBody>
+                  <a:tcPr marL="75428" marR="75428" marT="37714" marB="37714" anchor="ctr">
+                    <a:solidFill>
+                      <a:schemeClr val="bg1">
+                        <a:lumMod val="85000"/>
+                      </a:schemeClr>
+                    </a:solidFill>
+                  </a:tcPr>
+                </a:tc>
+                <a:tc>
+                  <a:txBody>
+                    <a:bodyPr/>
+                    <a:lstStyle/>
+                    <a:p>
+                      <a:pPr algn="l"/>
+                      <a:r>
+                        <a:rPr lang="en-US" sz="1500" b="0" i="0" kern="1200" dirty="0" err="1">
+                          <a:solidFill>
+                            <a:schemeClr val="tx1"/>
+                          </a:solidFill>
+                          <a:effectLst/>
+                          <a:latin typeface="Consolas" panose="020B0609020204030204" pitchFamily="49" charset="0"/>
+                          <a:ea typeface="+mn-ea"/>
+                          <a:cs typeface="+mn-cs"/>
+                        </a:rPr>
+                        <a:t>device_code</a:t>
+                      </a:r>
+                      <a:endParaRPr lang="de-AT" sz="1500" b="0" dirty="0">
+                        <a:latin typeface="Consolas" panose="020B0609020204030204" pitchFamily="49" charset="0"/>
+                      </a:endParaRPr>
+                    </a:p>
+                  </a:txBody>
+                  <a:tcPr marL="75428" marR="75428" marT="37714" marB="37714" anchor="ctr"/>
+                </a:tc>
+                <a:extLst>
+                  <a:ext uri="{0D108BD9-81ED-4DB2-BD59-A6C34878D82A}">
+                    <a16:rowId xmlns:a16="http://schemas.microsoft.com/office/drawing/2014/main" val="3088025262"/>
+                  </a:ext>
+                </a:extLst>
+              </a:tr>
+            </a:tbl>
+          </a:graphicData>
+        </a:graphic>
+      </p:graphicFrame>
+    </p:spTree>
+    <p:extLst>
+      <p:ext uri="{BB962C8B-B14F-4D97-AF65-F5344CB8AC3E}">
+        <p14:creationId xmlns:p14="http://schemas.microsoft.com/office/powerpoint/2010/main" val="1154701325"/>
+      </p:ext>
+    </p:extLst>
+  </p:cSld>
+  <p:clrMapOvr>
+    <a:masterClrMapping/>
+  </p:clrMapOvr>
+</p:sld>
+</file>
+
+<file path=ppt/slides/slide52.xml><?xml version="1.0" encoding="utf-8"?>
+<p:sld xmlns:a="http://schemas.openxmlformats.org/drawingml/2006/main" xmlns:r="http://schemas.openxmlformats.org/officeDocument/2006/relationships" xmlns:p="http://schemas.openxmlformats.org/presentationml/2006/main">
+  <p:cSld>
+    <p:spTree>
+      <p:nvGrpSpPr>
+        <p:cNvPr id="1" name=""/>
+        <p:cNvGrpSpPr/>
+        <p:nvPr/>
+      </p:nvGrpSpPr>
+      <p:grpSpPr>
+        <a:xfrm>
+          <a:off x="0" y="0"/>
+          <a:ext cx="0" cy="0"/>
+          <a:chOff x="0" y="0"/>
+          <a:chExt cx="0" cy="0"/>
+        </a:xfrm>
+      </p:grpSpPr>
+      <p:sp>
+        <p:nvSpPr>
+          <p:cNvPr id="4" name="Title 3">
+            <a:extLst>
+              <a:ext uri="{FF2B5EF4-FFF2-40B4-BE49-F238E27FC236}">
+                <a16:creationId xmlns:a16="http://schemas.microsoft.com/office/drawing/2014/main" id="{2B4AA342-048F-4EC1-9AEC-58DB48876605}"/>
+              </a:ext>
+            </a:extLst>
+          </p:cNvPr>
+          <p:cNvSpPr>
+            <a:spLocks noGrp="1"/>
+          </p:cNvSpPr>
+          <p:nvPr>
+            <p:ph type="title"/>
+          </p:nvPr>
+        </p:nvSpPr>
+        <p:spPr/>
+        <p:txBody>
+          <a:bodyPr/>
+          <a:lstStyle/>
+          <a:p>
+            <a:r>
+              <a:rPr lang="de-AT" dirty="0"/>
+              <a:t>Weitere Aspekte</a:t>
+            </a:r>
+            <a:endParaRPr lang="en-US" dirty="0"/>
+          </a:p>
+        </p:txBody>
+      </p:sp>
+      <p:sp>
+        <p:nvSpPr>
+          <p:cNvPr id="3" name="Content Placeholder 2">
+            <a:extLst>
+              <a:ext uri="{FF2B5EF4-FFF2-40B4-BE49-F238E27FC236}">
+                <a16:creationId xmlns:a16="http://schemas.microsoft.com/office/drawing/2014/main" id="{4FE66D17-637A-4F3D-A319-D169687A7D29}"/>
+              </a:ext>
+            </a:extLst>
+          </p:cNvPr>
+          <p:cNvSpPr>
+            <a:spLocks noGrp="1"/>
+          </p:cNvSpPr>
+          <p:nvPr>
+            <p:ph idx="1"/>
+          </p:nvPr>
+        </p:nvSpPr>
+        <p:spPr/>
+        <p:txBody>
+          <a:bodyPr/>
+          <a:lstStyle/>
+          <a:p>
+            <a:pPr marL="0" indent="0">
+              <a:buNone/>
+            </a:pPr>
+            <a:r>
+              <a:rPr lang="de-AT" dirty="0"/>
+              <a:t>OAuth 2.0 und </a:t>
+            </a:r>
+            <a:r>
+              <a:rPr lang="de-AT" dirty="0" err="1"/>
+              <a:t>OpenID</a:t>
+            </a:r>
+            <a:r>
+              <a:rPr lang="de-AT" dirty="0"/>
+              <a:t> Connect definieren nicht alles</a:t>
+            </a:r>
+          </a:p>
+          <a:p>
+            <a:pPr marL="0" indent="0">
+              <a:buNone/>
+            </a:pPr>
+            <a:endParaRPr lang="de-AT" dirty="0"/>
+          </a:p>
+          <a:p>
+            <a:r>
+              <a:rPr lang="de-AT" dirty="0"/>
+              <a:t>Identity Store</a:t>
+            </a:r>
+          </a:p>
+        </p:txBody>
+      </p:sp>
+    </p:spTree>
+    <p:extLst>
+      <p:ext uri="{BB962C8B-B14F-4D97-AF65-F5344CB8AC3E}">
+        <p14:creationId xmlns:p14="http://schemas.microsoft.com/office/powerpoint/2010/main" val="1458868968"/>
+      </p:ext>
+    </p:extLst>
+  </p:cSld>
+  <p:clrMapOvr>
+    <a:masterClrMapping/>
+  </p:clrMapOvr>
+</p:sld>
+</file>
+
+<file path=ppt/slides/slide53.xml><?xml version="1.0" encoding="utf-8"?>
+<p:sld xmlns:a="http://schemas.openxmlformats.org/drawingml/2006/main" xmlns:r="http://schemas.openxmlformats.org/officeDocument/2006/relationships" xmlns:p="http://schemas.openxmlformats.org/presentationml/2006/main">
+  <p:cSld>
+    <p:spTree>
+      <p:nvGrpSpPr>
+        <p:cNvPr id="1" name=""/>
+        <p:cNvGrpSpPr/>
+        <p:nvPr/>
+      </p:nvGrpSpPr>
+      <p:grpSpPr>
+        <a:xfrm>
+          <a:off x="0" y="0"/>
+          <a:ext cx="0" cy="0"/>
+          <a:chOff x="0" y="0"/>
+          <a:chExt cx="0" cy="0"/>
+        </a:xfrm>
+      </p:grpSpPr>
+      <p:sp>
+        <p:nvSpPr>
+          <p:cNvPr id="2" name="Title 1">
+            <a:extLst>
+              <a:ext uri="{FF2B5EF4-FFF2-40B4-BE49-F238E27FC236}">
                 <a16:creationId xmlns:a16="http://schemas.microsoft.com/office/drawing/2014/main" id="{04A30FA5-BC0C-476B-88DD-73B4FBB9406C}"/>
               </a:ext>
             </a:extLst>
@@ -45630,7 +46952,7 @@
 </p:sld>
 </file>
 
-<file path=ppt/slides/slide51.xml><?xml version="1.0" encoding="utf-8"?>
+<file path=ppt/slides/slide54.xml><?xml version="1.0" encoding="utf-8"?>
 <p:sld xmlns:a="http://schemas.openxmlformats.org/drawingml/2006/main" xmlns:r="http://schemas.openxmlformats.org/officeDocument/2006/relationships" xmlns:p="http://schemas.openxmlformats.org/presentationml/2006/main">
   <p:cSld>
     <p:spTree>
@@ -45879,7 +47201,7 @@
 </p:sld>
 </file>
 
-<file path=ppt/slides/slide52.xml><?xml version="1.0" encoding="utf-8"?>
+<file path=ppt/slides/slide55.xml><?xml version="1.0" encoding="utf-8"?>
 <p:sld xmlns:a="http://schemas.openxmlformats.org/drawingml/2006/main" xmlns:r="http://schemas.openxmlformats.org/officeDocument/2006/relationships" xmlns:p="http://schemas.openxmlformats.org/presentationml/2006/main" show="0">
   <p:cSld>
     <p:spTree>

</xml_diff>